<commit_message>
working on the notebooks
</commit_message>
<xml_diff>
--- a/01 - DataPreprocessing/01 - DataPreprocessing.pptx
+++ b/01 - DataPreprocessing/01 - DataPreprocessing.pptx
@@ -4026,10 +4026,9 @@
           <a:p>
             <a:pPr algn="l"/>
             <a:r>
-              <a:rPr lang="en-US"/>
+              <a:rPr lang="en-US" dirty="0"/>
               <a:t>Matteo Francia – University of Bologna</a:t>
             </a:r>
-            <a:endParaRPr lang="en-US" dirty="0"/>
           </a:p>
         </p:txBody>
       </p:sp>
@@ -6029,7 +6028,19 @@
           <a:p>
             <a:r>
               <a:rPr lang="it-IT" dirty="0"/>
-              <a:t>L’indice di una serie (index) è la sequenza delle </a:t>
+              <a:t>L’indice di una serie (</a:t>
+            </a:r>
+            <a:r>
+              <a:rPr lang="it-IT" dirty="0">
+                <a:solidFill>
+                  <a:schemeClr val="accent1"/>
+                </a:solidFill>
+              </a:rPr>
+              <a:t>index</a:t>
+            </a:r>
+            <a:r>
+              <a:rPr lang="it-IT" dirty="0"/>
+              <a:t>) è la sequenza delle </a:t>
             </a:r>
             <a:r>
               <a:rPr lang="en-US" dirty="0" err="1"/>
@@ -7210,7 +7221,12 @@
             <p:ph type="title"/>
           </p:nvPr>
         </p:nvSpPr>
-        <p:spPr/>
+        <p:spPr>
+          <a:xfrm>
+            <a:off x="838200" y="365125"/>
+            <a:ext cx="10515600" cy="1325563"/>
+          </a:xfrm>
+        </p:spPr>
         <p:txBody>
           <a:bodyPr/>
           <a:lstStyle/>
@@ -7239,527 +7255,216 @@
             <p:ph idx="1"/>
           </p:nvPr>
         </p:nvSpPr>
-        <p:spPr/>
-        <p:txBody>
-          <a:bodyPr/>
-          <a:lstStyle/>
-          <a:p>
-            <a:pPr algn="l"/>
-            <a:r>
-              <a:rPr lang="en-US" sz="1800" b="0" i="0" u="none" strike="noStrike" baseline="0" dirty="0">
-                <a:solidFill>
-                  <a:srgbClr val="000000"/>
-                </a:solidFill>
-                <a:latin typeface="Calibri" panose="020F0502020204030204" pitchFamily="34" charset="0"/>
-              </a:rPr>
+        <p:spPr>
+          <a:xfrm>
+            <a:off x="838200" y="1700499"/>
+            <a:ext cx="10515600" cy="4351338"/>
+          </a:xfrm>
+        </p:spPr>
+        <p:txBody>
+          <a:bodyPr/>
+          <a:lstStyle/>
+          <a:p>
+            <a:r>
+              <a:rPr lang="en-US" dirty="0"/>
               <a:t>Le </a:t>
             </a:r>
             <a:r>
-              <a:rPr lang="en-US" sz="1800" b="0" i="0" u="none" strike="noStrike" baseline="0" dirty="0" err="1">
-                <a:solidFill>
-                  <a:srgbClr val="000000"/>
-                </a:solidFill>
-                <a:latin typeface="Calibri" panose="020F0502020204030204" pitchFamily="34" charset="0"/>
-              </a:rPr>
+              <a:rPr lang="en-US" dirty="0" err="1"/>
               <a:t>serie</a:t>
             </a:r>
             <a:r>
-              <a:rPr lang="en-US" sz="1800" b="0" i="0" u="none" strike="noStrike" baseline="0" dirty="0">
-                <a:solidFill>
-                  <a:srgbClr val="000000"/>
-                </a:solidFill>
-                <a:latin typeface="Calibri" panose="020F0502020204030204" pitchFamily="34" charset="0"/>
-              </a:rPr>
+              <a:rPr lang="en-US" dirty="0"/>
               <a:t> </a:t>
             </a:r>
             <a:r>
-              <a:rPr lang="en-US" sz="1800" b="0" i="0" u="none" strike="noStrike" baseline="0" dirty="0" err="1">
-                <a:solidFill>
-                  <a:srgbClr val="000000"/>
-                </a:solidFill>
-                <a:latin typeface="Calibri" panose="020F0502020204030204" pitchFamily="34" charset="0"/>
-              </a:rPr>
+              <a:rPr lang="en-US" dirty="0" err="1"/>
               <a:t>supportano</a:t>
             </a:r>
             <a:r>
-              <a:rPr lang="en-US" sz="1800" b="0" i="0" u="none" strike="noStrike" baseline="0" dirty="0">
-                <a:solidFill>
-                  <a:srgbClr val="000000"/>
-                </a:solidFill>
-                <a:latin typeface="Calibri" panose="020F0502020204030204" pitchFamily="34" charset="0"/>
-              </a:rPr>
+              <a:rPr lang="en-US" dirty="0"/>
               <a:t> </a:t>
             </a:r>
             <a:r>
-              <a:rPr lang="en-US" sz="1800" b="0" i="0" u="none" strike="noStrike" baseline="0" dirty="0" err="1">
-                <a:solidFill>
-                  <a:srgbClr val="000000"/>
-                </a:solidFill>
-                <a:latin typeface="Calibri" panose="020F0502020204030204" pitchFamily="34" charset="0"/>
-              </a:rPr>
+              <a:rPr lang="en-US" dirty="0" err="1"/>
               <a:t>anche</a:t>
             </a:r>
             <a:r>
-              <a:rPr lang="en-US" sz="1800" b="0" i="0" u="none" strike="noStrike" baseline="0" dirty="0">
-                <a:solidFill>
-                  <a:srgbClr val="000000"/>
-                </a:solidFill>
-                <a:latin typeface="Calibri" panose="020F0502020204030204" pitchFamily="34" charset="0"/>
-              </a:rPr>
+              <a:rPr lang="en-US" dirty="0"/>
               <a:t> </a:t>
             </a:r>
             <a:r>
-              <a:rPr lang="en-US" sz="1800" b="0" i="0" u="none" strike="noStrike" baseline="0" dirty="0" err="1">
-                <a:solidFill>
-                  <a:srgbClr val="000000"/>
-                </a:solidFill>
-                <a:latin typeface="Calibri" panose="020F0502020204030204" pitchFamily="34" charset="0"/>
-              </a:rPr>
+              <a:rPr lang="en-US" dirty="0" err="1"/>
               <a:t>operazioni</a:t>
             </a:r>
             <a:r>
-              <a:rPr lang="en-US" sz="1800" b="0" i="0" u="none" strike="noStrike" baseline="0" dirty="0">
-                <a:solidFill>
-                  <a:srgbClr val="000000"/>
-                </a:solidFill>
-                <a:latin typeface="Calibri" panose="020F0502020204030204" pitchFamily="34" charset="0"/>
-              </a:rPr>
+              <a:rPr lang="en-US" dirty="0"/>
               <a:t> </a:t>
             </a:r>
             <a:r>
-              <a:rPr lang="en-US" sz="1800" b="0" i="0" u="none" strike="noStrike" baseline="0" dirty="0" err="1">
-                <a:solidFill>
-                  <a:srgbClr val="000000"/>
-                </a:solidFill>
-                <a:latin typeface="Calibri" panose="020F0502020204030204" pitchFamily="34" charset="0"/>
-              </a:rPr>
+              <a:rPr lang="en-US" dirty="0" err="1"/>
               <a:t>binarie</a:t>
             </a:r>
             <a:r>
-              <a:rPr lang="en-US" sz="1800" b="0" i="0" u="none" strike="noStrike" baseline="0" dirty="0">
-                <a:solidFill>
-                  <a:srgbClr val="000000"/>
-                </a:solidFill>
-                <a:latin typeface="Calibri" panose="020F0502020204030204" pitchFamily="34" charset="0"/>
-              </a:rPr>
+              <a:rPr lang="en-US" dirty="0"/>
               <a:t> </a:t>
             </a:r>
             <a:r>
-              <a:rPr lang="en-US" sz="1800" b="0" i="0" u="none" strike="noStrike" baseline="0" dirty="0" err="1">
-                <a:solidFill>
-                  <a:srgbClr val="000000"/>
-                </a:solidFill>
-                <a:latin typeface="Calibri" panose="020F0502020204030204" pitchFamily="34" charset="0"/>
-              </a:rPr>
+              <a:rPr lang="en-US" dirty="0" err="1"/>
               <a:t>tra</a:t>
             </a:r>
             <a:r>
-              <a:rPr lang="en-US" sz="1800" b="0" i="0" u="none" strike="noStrike" baseline="0" dirty="0">
-                <a:solidFill>
-                  <a:srgbClr val="000000"/>
-                </a:solidFill>
-                <a:latin typeface="Calibri" panose="020F0502020204030204" pitchFamily="34" charset="0"/>
-              </a:rPr>
+              <a:rPr lang="en-US" dirty="0"/>
               <a:t> </a:t>
             </a:r>
             <a:r>
-              <a:rPr lang="en-US" sz="1800" b="0" i="0" u="none" strike="noStrike" baseline="0" dirty="0" err="1">
-                <a:solidFill>
-                  <a:srgbClr val="000000"/>
-                </a:solidFill>
-                <a:latin typeface="Calibri" panose="020F0502020204030204" pitchFamily="34" charset="0"/>
-              </a:rPr>
+              <a:rPr lang="en-US" dirty="0" err="1"/>
               <a:t>esse</a:t>
             </a:r>
-            <a:endParaRPr lang="en-US" sz="1800" b="0" i="0" u="none" strike="noStrike" baseline="0" dirty="0">
-              <a:solidFill>
-                <a:srgbClr val="000000"/>
-              </a:solidFill>
-              <a:latin typeface="Calibri" panose="020F0502020204030204" pitchFamily="34" charset="0"/>
-            </a:endParaRPr>
+            <a:endParaRPr lang="en-US" dirty="0"/>
           </a:p>
           <a:p>
             <a:pPr lvl="1"/>
             <a:r>
-              <a:rPr lang="en-US" sz="1200" b="0" i="0" u="none" strike="noStrike" baseline="0" dirty="0">
-                <a:solidFill>
-                  <a:srgbClr val="000000"/>
-                </a:solidFill>
-                <a:latin typeface="Arial" panose="020B0604020202020204" pitchFamily="34" charset="0"/>
-              </a:rPr>
-              <a:t>– </a:t>
-            </a:r>
-            <a:r>
-              <a:rPr lang="en-US" sz="1200" b="0" i="0" u="none" strike="noStrike" baseline="0" dirty="0">
-                <a:solidFill>
-                  <a:srgbClr val="000000"/>
-                </a:solidFill>
-                <a:latin typeface="Calibri" panose="020F0502020204030204" pitchFamily="34" charset="0"/>
-              </a:rPr>
-              <a:t>con </a:t>
-            </a:r>
-            <a:r>
-              <a:rPr lang="en-US" sz="1200" b="0" i="0" u="none" strike="noStrike" baseline="0" dirty="0" err="1">
-                <a:solidFill>
-                  <a:srgbClr val="000000"/>
-                </a:solidFill>
-                <a:latin typeface="Calibri" panose="020F0502020204030204" pitchFamily="34" charset="0"/>
-              </a:rPr>
+              <a:rPr lang="en-US" dirty="0"/>
+              <a:t>Con </a:t>
+            </a:r>
+            <a:r>
+              <a:rPr lang="en-US" dirty="0" err="1"/>
               <a:t>operatori</a:t>
             </a:r>
             <a:r>
-              <a:rPr lang="en-US" sz="1200" b="0" i="0" u="none" strike="noStrike" baseline="0" dirty="0">
-                <a:solidFill>
-                  <a:srgbClr val="000000"/>
-                </a:solidFill>
-                <a:latin typeface="Calibri" panose="020F0502020204030204" pitchFamily="34" charset="0"/>
-              </a:rPr>
+              <a:rPr lang="en-US" dirty="0"/>
               <a:t> +, -, *, …</a:t>
             </a:r>
           </a:p>
           <a:p>
             <a:pPr lvl="1"/>
             <a:r>
-              <a:rPr lang="en-US" sz="1200" b="0" i="0" u="none" strike="noStrike" baseline="0" dirty="0">
-                <a:solidFill>
-                  <a:srgbClr val="000000"/>
-                </a:solidFill>
-                <a:latin typeface="Arial" panose="020B0604020202020204" pitchFamily="34" charset="0"/>
-              </a:rPr>
-              <a:t>– </a:t>
-            </a:r>
-            <a:r>
-              <a:rPr lang="en-US" sz="1200" b="0" i="0" u="none" strike="noStrike" baseline="0" dirty="0">
-                <a:solidFill>
-                  <a:srgbClr val="000000"/>
-                </a:solidFill>
-                <a:latin typeface="Calibri" panose="020F0502020204030204" pitchFamily="34" charset="0"/>
-              </a:rPr>
-              <a:t>con </a:t>
-            </a:r>
-            <a:r>
-              <a:rPr lang="en-US" sz="1200" b="0" i="0" u="none" strike="noStrike" baseline="0" dirty="0" err="1">
-                <a:solidFill>
-                  <a:srgbClr val="000000"/>
-                </a:solidFill>
-                <a:latin typeface="Calibri" panose="020F0502020204030204" pitchFamily="34" charset="0"/>
-              </a:rPr>
+              <a:rPr lang="en-US" dirty="0"/>
+              <a:t>Con </a:t>
+            </a:r>
+            <a:r>
+              <a:rPr lang="en-US" dirty="0" err="1"/>
               <a:t>funzioni</a:t>
             </a:r>
             <a:r>
-              <a:rPr lang="en-US" sz="1200" b="0" i="0" u="none" strike="noStrike" baseline="0" dirty="0">
-                <a:solidFill>
-                  <a:srgbClr val="000000"/>
-                </a:solidFill>
-                <a:latin typeface="Calibri" panose="020F0502020204030204" pitchFamily="34" charset="0"/>
-              </a:rPr>
+              <a:rPr lang="en-US" dirty="0"/>
               <a:t> </a:t>
             </a:r>
             <a:r>
-              <a:rPr lang="en-US" sz="1200" b="0" i="0" u="none" strike="noStrike" baseline="0" dirty="0" err="1">
-                <a:solidFill>
-                  <a:srgbClr val="000000"/>
-                </a:solidFill>
-                <a:latin typeface="Calibri" panose="020F0502020204030204" pitchFamily="34" charset="0"/>
-              </a:rPr>
+              <a:rPr lang="en-US" dirty="0" err="1"/>
               <a:t>universali</a:t>
             </a:r>
-            <a:endParaRPr lang="en-US" sz="1200" b="0" i="0" u="none" strike="noStrike" baseline="0" dirty="0">
-              <a:solidFill>
-                <a:srgbClr val="000000"/>
-              </a:solidFill>
-              <a:latin typeface="Calibri" panose="020F0502020204030204" pitchFamily="34" charset="0"/>
-            </a:endParaRPr>
-          </a:p>
-          <a:p>
-            <a:pPr algn="l"/>
-            <a:r>
-              <a:rPr lang="en-US" sz="1800" b="0" i="0" u="none" strike="noStrike" baseline="0" dirty="0" err="1">
-                <a:solidFill>
-                  <a:srgbClr val="000000"/>
-                </a:solidFill>
-                <a:latin typeface="Calibri" panose="020F0502020204030204" pitchFamily="34" charset="0"/>
-              </a:rPr>
+            <a:endParaRPr lang="en-US" dirty="0"/>
+          </a:p>
+          <a:p>
+            <a:r>
+              <a:rPr lang="en-US" dirty="0" err="1"/>
               <a:t>L’operazione</a:t>
             </a:r>
             <a:r>
-              <a:rPr lang="en-US" sz="1800" b="0" i="0" u="none" strike="noStrike" baseline="0" dirty="0">
-                <a:solidFill>
-                  <a:srgbClr val="000000"/>
-                </a:solidFill>
-                <a:latin typeface="Calibri" panose="020F0502020204030204" pitchFamily="34" charset="0"/>
-              </a:rPr>
+              <a:rPr lang="en-US" dirty="0"/>
               <a:t> è </a:t>
             </a:r>
             <a:r>
-              <a:rPr lang="en-US" sz="1800" b="0" i="0" u="none" strike="noStrike" baseline="0" dirty="0" err="1">
-                <a:solidFill>
-                  <a:srgbClr val="000000"/>
-                </a:solidFill>
-                <a:latin typeface="Calibri" panose="020F0502020204030204" pitchFamily="34" charset="0"/>
-              </a:rPr>
+              <a:rPr lang="en-US" dirty="0" err="1"/>
               <a:t>applicata</a:t>
             </a:r>
             <a:r>
-              <a:rPr lang="en-US" sz="1800" b="0" i="0" u="none" strike="noStrike" baseline="0" dirty="0">
-                <a:solidFill>
-                  <a:srgbClr val="000000"/>
-                </a:solidFill>
-                <a:latin typeface="Calibri" panose="020F0502020204030204" pitchFamily="34" charset="0"/>
-              </a:rPr>
+              <a:rPr lang="en-US" dirty="0"/>
+              <a:t> per </a:t>
+            </a:r>
+            <a:r>
+              <a:rPr lang="en-US" dirty="0" err="1"/>
+              <a:t>elementi</a:t>
+            </a:r>
+            <a:r>
+              <a:rPr lang="en-US" dirty="0"/>
+              <a:t> con </a:t>
+            </a:r>
+            <a:r>
+              <a:rPr lang="en-US" dirty="0" err="1"/>
+              <a:t>pari</a:t>
+            </a:r>
+            <a:r>
+              <a:rPr lang="en-US" dirty="0"/>
               <a:t> </a:t>
             </a:r>
             <a:r>
-              <a:rPr lang="en-US" sz="1800" b="0" i="0" u="none" strike="noStrike" baseline="0" dirty="0">
-                <a:solidFill>
-                  <a:srgbClr val="C1504D"/>
-                </a:solidFill>
-                <a:latin typeface="Calibri" panose="020F0502020204030204" pitchFamily="34" charset="0"/>
-              </a:rPr>
-              <a:t>per </a:t>
-            </a:r>
-            <a:r>
-              <a:rPr lang="en-US" sz="1800" b="0" i="0" u="none" strike="noStrike" baseline="0" dirty="0" err="1">
-                <a:solidFill>
-                  <a:srgbClr val="C1504D"/>
-                </a:solidFill>
-                <a:latin typeface="Calibri" panose="020F0502020204030204" pitchFamily="34" charset="0"/>
-              </a:rPr>
-              <a:t>elementi</a:t>
-            </a:r>
-            <a:r>
-              <a:rPr lang="en-US" sz="1800" b="0" i="0" u="none" strike="noStrike" baseline="0" dirty="0">
-                <a:solidFill>
-                  <a:srgbClr val="C1504D"/>
-                </a:solidFill>
-                <a:latin typeface="Calibri" panose="020F0502020204030204" pitchFamily="34" charset="0"/>
-              </a:rPr>
-              <a:t> con </a:t>
-            </a:r>
-            <a:r>
-              <a:rPr lang="en-US" sz="1800" b="0" i="0" u="none" strike="noStrike" baseline="0" dirty="0" err="1">
-                <a:solidFill>
-                  <a:srgbClr val="C1504D"/>
-                </a:solidFill>
-                <a:latin typeface="Calibri" panose="020F0502020204030204" pitchFamily="34" charset="0"/>
-              </a:rPr>
-              <a:t>pari</a:t>
-            </a:r>
-            <a:r>
-              <a:rPr lang="en-US" sz="1800" b="0" i="0" u="none" strike="noStrike" baseline="0" dirty="0">
-                <a:solidFill>
-                  <a:srgbClr val="C1504D"/>
-                </a:solidFill>
-                <a:latin typeface="Calibri" panose="020F0502020204030204" pitchFamily="34" charset="0"/>
-              </a:rPr>
+              <a:rPr lang="en-US" dirty="0" err="1"/>
+              <a:t>etichetta</a:t>
+            </a:r>
+            <a:endParaRPr lang="en-US" dirty="0"/>
+          </a:p>
+          <a:p>
+            <a:pPr lvl="1"/>
+            <a:r>
+              <a:rPr lang="en-US" dirty="0"/>
+              <a:t>Non </a:t>
+            </a:r>
+            <a:r>
+              <a:rPr lang="en-US" dirty="0" err="1"/>
+              <a:t>viene</a:t>
+            </a:r>
+            <a:r>
+              <a:rPr lang="en-US" dirty="0"/>
+              <a:t> considerate </a:t>
+            </a:r>
+            <a:r>
+              <a:rPr lang="en-US" dirty="0" err="1"/>
+              <a:t>l’ordine</a:t>
+            </a:r>
+            <a:r>
+              <a:rPr lang="en-US" dirty="0"/>
               <a:t> </a:t>
             </a:r>
             <a:r>
-              <a:rPr lang="en-US" sz="1800" b="0" i="0" u="none" strike="noStrike" baseline="0" dirty="0" err="1">
-                <a:solidFill>
-                  <a:srgbClr val="C1504D"/>
-                </a:solidFill>
-                <a:latin typeface="Calibri" panose="020F0502020204030204" pitchFamily="34" charset="0"/>
-              </a:rPr>
+              <a:rPr lang="en-US" dirty="0" err="1"/>
+              <a:t>dei</a:t>
+            </a:r>
+            <a:r>
+              <a:rPr lang="en-US" dirty="0"/>
+              <a:t> </a:t>
+            </a:r>
+            <a:r>
+              <a:rPr lang="en-US" dirty="0" err="1"/>
+              <a:t>valori</a:t>
+            </a:r>
+            <a:endParaRPr lang="en-US" dirty="0"/>
+          </a:p>
+          <a:p>
+            <a:r>
+              <a:rPr lang="en-US" dirty="0"/>
+              <a:t>Per </a:t>
+            </a:r>
+            <a:r>
+              <a:rPr lang="en-US" dirty="0" err="1"/>
+              <a:t>ogni</a:t>
+            </a:r>
+            <a:r>
+              <a:rPr lang="en-US" dirty="0"/>
+              <a:t> </a:t>
+            </a:r>
+            <a:r>
+              <a:rPr lang="en-US" dirty="0" err="1"/>
               <a:t>etichetta</a:t>
             </a:r>
-            <a:endParaRPr lang="en-US" sz="1800" b="0" i="0" u="none" strike="noStrike" baseline="0" dirty="0">
-              <a:solidFill>
-                <a:srgbClr val="C1504D"/>
-              </a:solidFill>
-              <a:latin typeface="Calibri" panose="020F0502020204030204" pitchFamily="34" charset="0"/>
-            </a:endParaRPr>
-          </a:p>
-          <a:p>
-            <a:pPr lvl="1"/>
-            <a:r>
-              <a:rPr lang="en-US" sz="1200" b="0" i="0" u="none" strike="noStrike" baseline="0" dirty="0">
-                <a:solidFill>
-                  <a:srgbClr val="000000"/>
-                </a:solidFill>
-                <a:latin typeface="Arial" panose="020B0604020202020204" pitchFamily="34" charset="0"/>
-              </a:rPr>
-              <a:t>– </a:t>
-            </a:r>
-            <a:r>
-              <a:rPr lang="en-US" sz="1200" b="0" i="0" u="none" strike="noStrike" baseline="0" dirty="0">
-                <a:solidFill>
-                  <a:srgbClr val="000000"/>
-                </a:solidFill>
-                <a:latin typeface="Calibri" panose="020F0502020204030204" pitchFamily="34" charset="0"/>
-              </a:rPr>
-              <a:t>non </a:t>
-            </a:r>
-            <a:r>
-              <a:rPr lang="en-US" sz="1200" b="0" i="0" u="none" strike="noStrike" baseline="0" dirty="0" err="1">
-                <a:solidFill>
-                  <a:srgbClr val="000000"/>
-                </a:solidFill>
-                <a:latin typeface="Calibri" panose="020F0502020204030204" pitchFamily="34" charset="0"/>
-              </a:rPr>
-              <a:t>viene</a:t>
-            </a:r>
-            <a:r>
-              <a:rPr lang="en-US" sz="1200" b="0" i="0" u="none" strike="noStrike" baseline="0" dirty="0">
-                <a:solidFill>
-                  <a:srgbClr val="000000"/>
-                </a:solidFill>
-                <a:latin typeface="Calibri" panose="020F0502020204030204" pitchFamily="34" charset="0"/>
-              </a:rPr>
-              <a:t> considerate </a:t>
-            </a:r>
-            <a:r>
-              <a:rPr lang="en-US" sz="1200" b="0" i="0" u="none" strike="noStrike" baseline="0" dirty="0" err="1">
-                <a:solidFill>
-                  <a:srgbClr val="000000"/>
-                </a:solidFill>
-                <a:latin typeface="Calibri" panose="020F0502020204030204" pitchFamily="34" charset="0"/>
-              </a:rPr>
-              <a:t>l’ordine</a:t>
-            </a:r>
-            <a:r>
-              <a:rPr lang="en-US" sz="1200" b="0" i="0" u="none" strike="noStrike" baseline="0" dirty="0">
-                <a:solidFill>
-                  <a:srgbClr val="000000"/>
-                </a:solidFill>
-                <a:latin typeface="Calibri" panose="020F0502020204030204" pitchFamily="34" charset="0"/>
-              </a:rPr>
+            <a:r>
+              <a:rPr lang="en-US" dirty="0"/>
               <a:t> </a:t>
             </a:r>
             <a:r>
-              <a:rPr lang="en-US" sz="1200" b="0" i="0" u="none" strike="noStrike" baseline="0" dirty="0" err="1">
-                <a:solidFill>
-                  <a:srgbClr val="000000"/>
-                </a:solidFill>
-                <a:latin typeface="Calibri" panose="020F0502020204030204" pitchFamily="34" charset="0"/>
-              </a:rPr>
-              <a:t>dei</a:t>
-            </a:r>
-            <a:r>
-              <a:rPr lang="en-US" sz="1200" b="0" i="0" u="none" strike="noStrike" baseline="0" dirty="0">
-                <a:solidFill>
-                  <a:srgbClr val="000000"/>
-                </a:solidFill>
-                <a:latin typeface="Calibri" panose="020F0502020204030204" pitchFamily="34" charset="0"/>
-              </a:rPr>
+              <a:rPr lang="en-US" dirty="0" err="1"/>
+              <a:t>presente</a:t>
+            </a:r>
+            <a:r>
+              <a:rPr lang="en-US" dirty="0"/>
               <a:t> </a:t>
             </a:r>
             <a:r>
-              <a:rPr lang="en-US" sz="1200" b="0" i="0" u="none" strike="noStrike" baseline="0" dirty="0" err="1">
-                <a:solidFill>
-                  <a:srgbClr val="000000"/>
-                </a:solidFill>
-                <a:latin typeface="Calibri" panose="020F0502020204030204" pitchFamily="34" charset="0"/>
-              </a:rPr>
-              <a:t>valori</a:t>
-            </a:r>
-            <a:endParaRPr lang="en-US" sz="1200" b="0" i="0" u="none" strike="noStrike" baseline="0" dirty="0">
-              <a:solidFill>
-                <a:srgbClr val="000000"/>
-              </a:solidFill>
-              <a:latin typeface="Calibri" panose="020F0502020204030204" pitchFamily="34" charset="0"/>
-            </a:endParaRPr>
-          </a:p>
-          <a:p>
-            <a:pPr algn="l"/>
-            <a:r>
-              <a:rPr lang="en-US" sz="1800" b="0" i="0" u="none" strike="noStrike" baseline="0" dirty="0">
-                <a:solidFill>
-                  <a:srgbClr val="000000"/>
-                </a:solidFill>
-                <a:latin typeface="Calibri" panose="020F0502020204030204" pitchFamily="34" charset="0"/>
-              </a:rPr>
-              <a:t>Per </a:t>
-            </a:r>
-            <a:r>
-              <a:rPr lang="en-US" sz="1800" b="0" i="0" u="none" strike="noStrike" baseline="0" dirty="0" err="1">
-                <a:solidFill>
-                  <a:srgbClr val="000000"/>
-                </a:solidFill>
-                <a:latin typeface="Calibri" panose="020F0502020204030204" pitchFamily="34" charset="0"/>
-              </a:rPr>
-              <a:t>ogni</a:t>
-            </a:r>
-            <a:r>
-              <a:rPr lang="en-US" sz="1800" b="0" i="0" u="none" strike="noStrike" baseline="0" dirty="0">
-                <a:solidFill>
-                  <a:srgbClr val="000000"/>
-                </a:solidFill>
-                <a:latin typeface="Calibri" panose="020F0502020204030204" pitchFamily="34" charset="0"/>
-              </a:rPr>
-              <a:t> </a:t>
-            </a:r>
-            <a:r>
-              <a:rPr lang="en-US" sz="1800" b="0" i="0" u="none" strike="noStrike" baseline="0" dirty="0" err="1">
-                <a:solidFill>
-                  <a:srgbClr val="000000"/>
-                </a:solidFill>
-                <a:latin typeface="Calibri" panose="020F0502020204030204" pitchFamily="34" charset="0"/>
-              </a:rPr>
-              <a:t>etichetta</a:t>
-            </a:r>
-            <a:r>
-              <a:rPr lang="en-US" sz="1800" b="0" i="0" u="none" strike="noStrike" baseline="0" dirty="0">
-                <a:solidFill>
-                  <a:srgbClr val="000000"/>
-                </a:solidFill>
-                <a:latin typeface="Calibri" panose="020F0502020204030204" pitchFamily="34" charset="0"/>
-              </a:rPr>
-              <a:t> </a:t>
-            </a:r>
-            <a:r>
-              <a:rPr lang="en-US" sz="1800" b="0" i="0" u="none" strike="noStrike" baseline="0" dirty="0" err="1">
-                <a:solidFill>
-                  <a:srgbClr val="000000"/>
-                </a:solidFill>
-                <a:latin typeface="Calibri" panose="020F0502020204030204" pitchFamily="34" charset="0"/>
-              </a:rPr>
-              <a:t>presente</a:t>
-            </a:r>
-            <a:r>
-              <a:rPr lang="en-US" sz="1800" b="0" i="0" u="none" strike="noStrike" baseline="0" dirty="0">
-                <a:solidFill>
-                  <a:srgbClr val="000000"/>
-                </a:solidFill>
-                <a:latin typeface="Calibri" panose="020F0502020204030204" pitchFamily="34" charset="0"/>
-              </a:rPr>
-              <a:t> </a:t>
-            </a:r>
-            <a:r>
-              <a:rPr lang="it-IT" sz="1800" b="0" i="0" u="none" strike="noStrike" baseline="0" dirty="0">
-                <a:solidFill>
-                  <a:srgbClr val="FF0000"/>
-                </a:solidFill>
-                <a:latin typeface="Calibri" panose="020F0502020204030204" pitchFamily="34" charset="0"/>
-              </a:rPr>
-              <a:t>solo in un operando </a:t>
-            </a:r>
-            <a:r>
-              <a:rPr lang="it-IT" sz="1800" b="0" i="0" u="none" strike="noStrike" baseline="0" dirty="0">
-                <a:solidFill>
-                  <a:srgbClr val="000000"/>
-                </a:solidFill>
-                <a:latin typeface="Calibri" panose="020F0502020204030204" pitchFamily="34" charset="0"/>
-              </a:rPr>
-              <a:t>si avrà un valore </a:t>
-            </a:r>
-            <a:r>
-              <a:rPr lang="it-IT" sz="1800" b="0" i="0" u="none" strike="noStrike" baseline="0" dirty="0">
-                <a:solidFill>
-                  <a:srgbClr val="FF0000"/>
-                </a:solidFill>
-                <a:latin typeface="Calibri" panose="020F0502020204030204" pitchFamily="34" charset="0"/>
-              </a:rPr>
-              <a:t>NA </a:t>
-            </a:r>
-            <a:r>
-              <a:rPr lang="it-IT" sz="1800" b="0" i="0" u="none" strike="noStrike" baseline="0" dirty="0">
-                <a:solidFill>
-                  <a:srgbClr val="000000"/>
-                </a:solidFill>
-                <a:latin typeface="Calibri" panose="020F0502020204030204" pitchFamily="34" charset="0"/>
-              </a:rPr>
-              <a:t>nel risultato</a:t>
+              <a:rPr lang="it-IT" dirty="0"/>
+              <a:t>solo in un operando si avrà un valore NA nel risultato</a:t>
             </a:r>
             <a:endParaRPr lang="en-US" dirty="0"/>
           </a:p>
@@ -7781,13 +7486,18 @@
             <p:ph type="ftr" sz="quarter" idx="11"/>
           </p:nvPr>
         </p:nvSpPr>
-        <p:spPr/>
-        <p:txBody>
-          <a:bodyPr/>
-          <a:lstStyle/>
-          <a:p>
-            <a:r>
-              <a:rPr lang="it-IT"/>
+        <p:spPr>
+          <a:xfrm>
+            <a:off x="-1" y="6492875"/>
+            <a:ext cx="2837793" cy="365125"/>
+          </a:xfrm>
+        </p:spPr>
+        <p:txBody>
+          <a:bodyPr/>
+          <a:lstStyle/>
+          <a:p>
+            <a:r>
+              <a:rPr lang="it-IT" dirty="0"/>
               <a:t>Matteo Francia – University of Bologna</a:t>
             </a:r>
           </a:p>
@@ -7809,13 +7519,19 @@
             <p:ph type="sldNum" sz="quarter" idx="12"/>
           </p:nvPr>
         </p:nvSpPr>
-        <p:spPr/>
+        <p:spPr>
+          <a:xfrm>
+            <a:off x="9448800" y="6492874"/>
+            <a:ext cx="2743200" cy="365125"/>
+          </a:xfrm>
+        </p:spPr>
         <p:txBody>
           <a:bodyPr/>
           <a:lstStyle/>
           <a:p>
             <a:fld id="{5DD6F1BA-2510-46FC-9346-AB1F3CA1593B}" type="slidenum">
               <a:rPr lang="it-IT" smtClean="0"/>
+              <a:pPr/>
               <a:t>18</a:t>
             </a:fld>
             <a:endParaRPr lang="it-IT"/>
@@ -7868,7 +7584,12 @@
             <p:ph type="title"/>
           </p:nvPr>
         </p:nvSpPr>
-        <p:spPr/>
+        <p:spPr>
+          <a:xfrm>
+            <a:off x="838200" y="365125"/>
+            <a:ext cx="10515600" cy="1325563"/>
+          </a:xfrm>
+        </p:spPr>
         <p:txBody>
           <a:bodyPr/>
           <a:lstStyle/>
@@ -7897,523 +7618,329 @@
             <p:ph idx="1"/>
           </p:nvPr>
         </p:nvSpPr>
-        <p:spPr/>
-        <p:txBody>
-          <a:bodyPr/>
-          <a:lstStyle/>
-          <a:p>
-            <a:pPr algn="l"/>
-            <a:r>
-              <a:rPr lang="it-IT" sz="1800" b="0" i="0" u="none" strike="noStrike" baseline="0" dirty="0">
-                <a:solidFill>
-                  <a:srgbClr val="000000"/>
-                </a:solidFill>
-                <a:latin typeface="Calibri" panose="020F0502020204030204" pitchFamily="34" charset="0"/>
-              </a:rPr>
-              <a:t>Le serie offrono metodi per calcolare </a:t>
-            </a:r>
-            <a:r>
-              <a:rPr lang="it-IT" sz="1800" b="0" i="0" u="none" strike="noStrike" baseline="0" dirty="0">
-                <a:solidFill>
-                  <a:srgbClr val="78933C"/>
-                </a:solidFill>
-                <a:latin typeface="Calibri" panose="020F0502020204030204" pitchFamily="34" charset="0"/>
-              </a:rPr>
-              <a:t>statistiche aggregate </a:t>
-            </a:r>
-            <a:r>
-              <a:rPr lang="it-IT" sz="1800" b="0" i="0" u="none" strike="noStrike" baseline="0" dirty="0">
-                <a:solidFill>
-                  <a:srgbClr val="000000"/>
-                </a:solidFill>
-                <a:latin typeface="Calibri" panose="020F0502020204030204" pitchFamily="34" charset="0"/>
-              </a:rPr>
-              <a:t>sui</a:t>
-            </a:r>
-          </a:p>
-          <a:p>
-            <a:pPr algn="l"/>
-            <a:r>
-              <a:rPr lang="it-IT" sz="1800" b="0" i="0" u="none" strike="noStrike" baseline="0" dirty="0">
-                <a:solidFill>
-                  <a:srgbClr val="000000"/>
-                </a:solidFill>
-                <a:latin typeface="Calibri" panose="020F0502020204030204" pitchFamily="34" charset="0"/>
-              </a:rPr>
-              <a:t>valori con nomi e funzionamento pari a quelle degli </a:t>
-            </a:r>
-            <a:r>
-              <a:rPr lang="it-IT" sz="1800" b="0" i="0" u="none" strike="noStrike" baseline="0" dirty="0" err="1">
-                <a:solidFill>
-                  <a:srgbClr val="4F82BE"/>
-                </a:solidFill>
-                <a:latin typeface="Lucida Console" panose="020B0609040504020204" pitchFamily="49" charset="0"/>
-              </a:rPr>
+        <p:spPr>
+          <a:xfrm>
+            <a:off x="838200" y="1700499"/>
+            <a:ext cx="10515600" cy="4351338"/>
+          </a:xfrm>
+        </p:spPr>
+        <p:txBody>
+          <a:bodyPr/>
+          <a:lstStyle/>
+          <a:p>
+            <a:r>
+              <a:rPr lang="it-IT" dirty="0"/>
+              <a:t>Le serie offrono metodi per calcolare statistiche aggregate sui valori con nomi e funzionamento pari a quelle degli </a:t>
+            </a:r>
+            <a:r>
+              <a:rPr lang="it-IT" dirty="0" err="1"/>
               <a:t>ndarray</a:t>
             </a:r>
-            <a:endParaRPr lang="it-IT" sz="1800" b="0" i="0" u="none" strike="noStrike" baseline="0" dirty="0">
-              <a:solidFill>
-                <a:srgbClr val="4F82BE"/>
-              </a:solidFill>
-              <a:latin typeface="Lucida Console" panose="020B0609040504020204" pitchFamily="49" charset="0"/>
-            </a:endParaRPr>
-          </a:p>
-          <a:p>
-            <a:pPr algn="l"/>
-            <a:r>
-              <a:rPr lang="it-IT" sz="1800" b="0" i="0" u="none" strike="noStrike" baseline="0" dirty="0">
-                <a:solidFill>
-                  <a:srgbClr val="4F82BE"/>
-                </a:solidFill>
-                <a:latin typeface="Arial" panose="020B0604020202020204" pitchFamily="34" charset="0"/>
-              </a:rPr>
-              <a:t>– </a:t>
-            </a:r>
-            <a:r>
-              <a:rPr lang="it-IT" sz="1800" b="0" i="0" u="none" strike="noStrike" baseline="0" dirty="0">
-                <a:solidFill>
-                  <a:srgbClr val="4F82BE"/>
-                </a:solidFill>
-                <a:latin typeface="Lucida Console" panose="020B0609040504020204" pitchFamily="49" charset="0"/>
-              </a:rPr>
-              <a:t>sum </a:t>
-            </a:r>
-            <a:r>
-              <a:rPr lang="it-IT" sz="1800" b="0" i="0" u="none" strike="noStrike" baseline="0" dirty="0">
-                <a:solidFill>
-                  <a:srgbClr val="000000"/>
-                </a:solidFill>
-                <a:latin typeface="Calibri" panose="020F0502020204030204" pitchFamily="34" charset="0"/>
-              </a:rPr>
-              <a:t>(somma), </a:t>
-            </a:r>
-            <a:r>
-              <a:rPr lang="it-IT" sz="1800" b="0" i="0" u="none" strike="noStrike" baseline="0" dirty="0" err="1">
-                <a:solidFill>
-                  <a:srgbClr val="4F82BE"/>
-                </a:solidFill>
-                <a:latin typeface="Lucida Console" panose="020B0609040504020204" pitchFamily="49" charset="0"/>
+            <a:endParaRPr lang="it-IT" dirty="0"/>
+          </a:p>
+          <a:p>
+            <a:pPr lvl="1"/>
+            <a:r>
+              <a:rPr lang="it-IT" dirty="0">
+                <a:solidFill>
+                  <a:schemeClr val="accent1"/>
+                </a:solidFill>
+              </a:rPr>
+              <a:t>sum</a:t>
+            </a:r>
+            <a:r>
+              <a:rPr lang="it-IT" dirty="0"/>
+              <a:t> (somma), </a:t>
+            </a:r>
+            <a:r>
+              <a:rPr lang="it-IT" dirty="0" err="1">
+                <a:solidFill>
+                  <a:schemeClr val="accent1"/>
+                </a:solidFill>
               </a:rPr>
               <a:t>mean</a:t>
             </a:r>
             <a:r>
-              <a:rPr lang="it-IT" sz="1800" b="0" i="0" u="none" strike="noStrike" baseline="0" dirty="0">
-                <a:solidFill>
-                  <a:srgbClr val="4F82BE"/>
-                </a:solidFill>
-                <a:latin typeface="Lucida Console" panose="020B0609040504020204" pitchFamily="49" charset="0"/>
-              </a:rPr>
-              <a:t> </a:t>
-            </a:r>
-            <a:r>
-              <a:rPr lang="it-IT" sz="1800" b="0" i="0" u="none" strike="noStrike" baseline="0" dirty="0">
-                <a:solidFill>
-                  <a:srgbClr val="000000"/>
-                </a:solidFill>
-                <a:latin typeface="Calibri" panose="020F0502020204030204" pitchFamily="34" charset="0"/>
-              </a:rPr>
-              <a:t>(media), </a:t>
-            </a:r>
-            <a:r>
-              <a:rPr lang="it-IT" sz="1800" b="0" i="0" u="none" strike="noStrike" baseline="0" dirty="0">
-                <a:solidFill>
-                  <a:srgbClr val="4F82BE"/>
-                </a:solidFill>
-                <a:latin typeface="Lucida Console" panose="020B0609040504020204" pitchFamily="49" charset="0"/>
-              </a:rPr>
-              <a:t>min </a:t>
-            </a:r>
-            <a:r>
-              <a:rPr lang="it-IT" sz="1800" b="0" i="0" u="none" strike="noStrike" baseline="0" dirty="0">
-                <a:solidFill>
-                  <a:srgbClr val="000000"/>
-                </a:solidFill>
-                <a:latin typeface="Calibri" panose="020F0502020204030204" pitchFamily="34" charset="0"/>
-              </a:rPr>
-              <a:t>(minimo), </a:t>
-            </a:r>
-            <a:r>
-              <a:rPr lang="it-IT" sz="1800" b="0" i="0" u="none" strike="noStrike" baseline="0" dirty="0">
-                <a:solidFill>
-                  <a:srgbClr val="4F82BE"/>
-                </a:solidFill>
-                <a:latin typeface="Lucida Console" panose="020B0609040504020204" pitchFamily="49" charset="0"/>
-              </a:rPr>
-              <a:t>max </a:t>
-            </a:r>
-            <a:r>
-              <a:rPr lang="it-IT" sz="1800" b="0" i="0" u="none" strike="noStrike" baseline="0" dirty="0">
-                <a:solidFill>
-                  <a:srgbClr val="000000"/>
-                </a:solidFill>
-                <a:latin typeface="Calibri" panose="020F0502020204030204" pitchFamily="34" charset="0"/>
-              </a:rPr>
-              <a:t>(massimo), …</a:t>
-            </a:r>
-          </a:p>
-          <a:p>
-            <a:pPr algn="l"/>
-            <a:r>
-              <a:rPr lang="it-IT" sz="1800" b="0" i="0" u="none" strike="noStrike" baseline="0" dirty="0">
-                <a:solidFill>
-                  <a:srgbClr val="000000"/>
-                </a:solidFill>
-                <a:latin typeface="Calibri" panose="020F0502020204030204" pitchFamily="34" charset="0"/>
-              </a:rPr>
-              <a:t>Di default, eventuali </a:t>
-            </a:r>
-            <a:r>
-              <a:rPr lang="it-IT" sz="1800" b="0" i="0" u="none" strike="noStrike" baseline="0" dirty="0">
-                <a:solidFill>
-                  <a:srgbClr val="78933C"/>
-                </a:solidFill>
-                <a:latin typeface="Calibri" panose="020F0502020204030204" pitchFamily="34" charset="0"/>
-              </a:rPr>
-              <a:t>valori mancanti vengono ignorati</a:t>
-            </a:r>
-          </a:p>
-          <a:p>
-            <a:pPr algn="l"/>
-            <a:r>
-              <a:rPr lang="en-US" sz="1800" b="0" i="0" u="none" strike="noStrike" baseline="0" dirty="0">
-                <a:solidFill>
-                  <a:srgbClr val="4F82BE"/>
-                </a:solidFill>
-                <a:latin typeface="Lucida Console" panose="020B0609040504020204" pitchFamily="49" charset="0"/>
+              <a:rPr lang="it-IT" dirty="0"/>
+              <a:t> (media), </a:t>
+            </a:r>
+            <a:r>
+              <a:rPr lang="it-IT" dirty="0">
+                <a:solidFill>
+                  <a:schemeClr val="accent1"/>
+                </a:solidFill>
+              </a:rPr>
+              <a:t>min</a:t>
+            </a:r>
+            <a:r>
+              <a:rPr lang="it-IT" dirty="0"/>
+              <a:t> (minimo), </a:t>
+            </a:r>
+            <a:r>
+              <a:rPr lang="it-IT" dirty="0">
+                <a:solidFill>
+                  <a:schemeClr val="accent1"/>
+                </a:solidFill>
+              </a:rPr>
+              <a:t>max</a:t>
+            </a:r>
+            <a:r>
+              <a:rPr lang="it-IT" dirty="0"/>
+              <a:t> (massimo), …</a:t>
+            </a:r>
+          </a:p>
+          <a:p>
+            <a:pPr lvl="1"/>
+            <a:r>
+              <a:rPr lang="it-IT" dirty="0"/>
+              <a:t>Di default, eventuali valori mancanti vengono ignorati</a:t>
+            </a:r>
+          </a:p>
+          <a:p>
+            <a:pPr marL="457200" lvl="1" indent="0">
+              <a:buNone/>
+            </a:pPr>
+            <a:r>
+              <a:rPr lang="en-US" dirty="0">
+                <a:solidFill>
+                  <a:schemeClr val="accent1"/>
+                </a:solidFill>
+              </a:rPr>
+              <a:t>	&gt;&gt;&gt; </a:t>
+            </a:r>
+            <a:r>
+              <a:rPr lang="en-US" dirty="0" err="1">
+                <a:solidFill>
+                  <a:schemeClr val="accent1"/>
+                </a:solidFill>
+              </a:rPr>
+              <a:t>pd.Series</a:t>
+            </a:r>
+            <a:r>
+              <a:rPr lang="en-US" dirty="0">
+                <a:solidFill>
+                  <a:schemeClr val="accent1"/>
+                </a:solidFill>
+              </a:rPr>
+              <a:t>([2, </a:t>
+            </a:r>
+            <a:r>
+              <a:rPr lang="en-US" dirty="0" err="1">
+                <a:solidFill>
+                  <a:schemeClr val="accent1"/>
+                </a:solidFill>
+              </a:rPr>
+              <a:t>np.nan</a:t>
+            </a:r>
+            <a:r>
+              <a:rPr lang="en-US" dirty="0">
+                <a:solidFill>
+                  <a:schemeClr val="accent1"/>
+                </a:solidFill>
+              </a:rPr>
+              <a:t>, 6, 4]).mean()</a:t>
+            </a:r>
+          </a:p>
+          <a:p>
+            <a:pPr marL="457200" lvl="1" indent="0">
+              <a:buNone/>
+            </a:pPr>
+            <a:r>
+              <a:rPr lang="en-US" dirty="0">
+                <a:solidFill>
+                  <a:schemeClr val="accent1"/>
+                </a:solidFill>
+              </a:rPr>
+              <a:t>	4.0</a:t>
+            </a:r>
+          </a:p>
+          <a:p>
+            <a:r>
+              <a:rPr lang="it-IT" dirty="0"/>
+              <a:t>Specificando </a:t>
+            </a:r>
+            <a:r>
+              <a:rPr lang="it-IT" dirty="0" err="1">
+                <a:solidFill>
+                  <a:schemeClr val="accent1"/>
+                </a:solidFill>
+              </a:rPr>
+              <a:t>skipna</a:t>
+            </a:r>
+            <a:r>
+              <a:rPr lang="it-IT" dirty="0">
+                <a:solidFill>
+                  <a:schemeClr val="accent1"/>
+                </a:solidFill>
+              </a:rPr>
+              <a:t>=False </a:t>
+            </a:r>
+            <a:r>
+              <a:rPr lang="it-IT" dirty="0"/>
+              <a:t>invece gli NA invalidano il calcolo</a:t>
+            </a:r>
+          </a:p>
+          <a:p>
+            <a:pPr marL="457200" lvl="1" indent="0">
+              <a:buNone/>
+            </a:pPr>
+            <a:r>
+              <a:rPr lang="en-US" dirty="0">
+                <a:solidFill>
+                  <a:schemeClr val="accent1"/>
+                </a:solidFill>
               </a:rPr>
               <a:t>&gt;&gt;&gt; </a:t>
             </a:r>
             <a:r>
-              <a:rPr lang="en-US" sz="1800" b="0" i="0" u="none" strike="noStrike" baseline="0" dirty="0" err="1">
-                <a:solidFill>
-                  <a:srgbClr val="4F82BE"/>
-                </a:solidFill>
-                <a:latin typeface="Lucida Console" panose="020B0609040504020204" pitchFamily="49" charset="0"/>
+              <a:rPr lang="en-US" dirty="0" err="1">
+                <a:solidFill>
+                  <a:schemeClr val="accent1"/>
+                </a:solidFill>
               </a:rPr>
               <a:t>pd.Series</a:t>
             </a:r>
             <a:r>
-              <a:rPr lang="en-US" sz="1800" b="0" i="0" u="none" strike="noStrike" baseline="0" dirty="0">
-                <a:solidFill>
-                  <a:srgbClr val="4F82BE"/>
-                </a:solidFill>
-                <a:latin typeface="Lucida Console" panose="020B0609040504020204" pitchFamily="49" charset="0"/>
+              <a:rPr lang="en-US" dirty="0">
+                <a:solidFill>
+                  <a:schemeClr val="accent1"/>
+                </a:solidFill>
               </a:rPr>
               <a:t>([2, </a:t>
             </a:r>
             <a:r>
-              <a:rPr lang="en-US" sz="1800" b="0" i="0" u="none" strike="noStrike" baseline="0" dirty="0" err="1">
-                <a:solidFill>
-                  <a:srgbClr val="FF0000"/>
-                </a:solidFill>
-                <a:latin typeface="Lucida Console" panose="020B0609040504020204" pitchFamily="49" charset="0"/>
+              <a:rPr lang="en-US" dirty="0" err="1">
+                <a:solidFill>
+                  <a:schemeClr val="accent1"/>
+                </a:solidFill>
               </a:rPr>
               <a:t>np.nan</a:t>
             </a:r>
             <a:r>
-              <a:rPr lang="en-US" sz="1800" b="0" i="0" u="none" strike="noStrike" baseline="0" dirty="0">
-                <a:solidFill>
-                  <a:srgbClr val="4F82BE"/>
-                </a:solidFill>
-                <a:latin typeface="Lucida Console" panose="020B0609040504020204" pitchFamily="49" charset="0"/>
-              </a:rPr>
-              <a:t>, 6, 4]).mean()</a:t>
-            </a:r>
-          </a:p>
-          <a:p>
-            <a:pPr algn="l"/>
-            <a:r>
-              <a:rPr lang="en-US" sz="1800" b="0" i="0" u="none" strike="noStrike" baseline="0" dirty="0">
-                <a:solidFill>
-                  <a:srgbClr val="4F82BE"/>
-                </a:solidFill>
-                <a:latin typeface="Lucida Console" panose="020B0609040504020204" pitchFamily="49" charset="0"/>
-              </a:rPr>
-              <a:t>4.0</a:t>
-            </a:r>
-          </a:p>
-          <a:p>
-            <a:pPr algn="l"/>
-            <a:r>
-              <a:rPr lang="it-IT" sz="1800" b="0" i="0" u="none" strike="noStrike" baseline="0" dirty="0">
-                <a:solidFill>
-                  <a:srgbClr val="000000"/>
-                </a:solidFill>
-                <a:latin typeface="Calibri" panose="020F0502020204030204" pitchFamily="34" charset="0"/>
-              </a:rPr>
-              <a:t>Specificando </a:t>
-            </a:r>
-            <a:r>
-              <a:rPr lang="it-IT" sz="1800" b="0" i="0" u="none" strike="noStrike" baseline="0" dirty="0" err="1">
-                <a:solidFill>
-                  <a:srgbClr val="4F82BE"/>
-                </a:solidFill>
-                <a:latin typeface="Lucida Console" panose="020B0609040504020204" pitchFamily="49" charset="0"/>
+              <a:rPr lang="en-US" dirty="0">
+                <a:solidFill>
+                  <a:schemeClr val="accent1"/>
+                </a:solidFill>
+              </a:rPr>
+              <a:t>, 6, 4]).mean(</a:t>
+            </a:r>
+            <a:r>
+              <a:rPr lang="en-US" dirty="0" err="1">
+                <a:solidFill>
+                  <a:schemeClr val="accent1"/>
+                </a:solidFill>
               </a:rPr>
               <a:t>skipna</a:t>
             </a:r>
             <a:r>
-              <a:rPr lang="it-IT" sz="1800" b="0" i="0" u="none" strike="noStrike" baseline="0" dirty="0">
-                <a:solidFill>
-                  <a:srgbClr val="4F82BE"/>
-                </a:solidFill>
-                <a:latin typeface="Lucida Console" panose="020B0609040504020204" pitchFamily="49" charset="0"/>
-              </a:rPr>
-              <a:t>=False </a:t>
-            </a:r>
-            <a:r>
-              <a:rPr lang="it-IT" sz="1800" b="0" i="0" u="none" strike="noStrike" baseline="0" dirty="0">
-                <a:solidFill>
-                  <a:srgbClr val="000000"/>
-                </a:solidFill>
-                <a:latin typeface="Calibri" panose="020F0502020204030204" pitchFamily="34" charset="0"/>
-              </a:rPr>
-              <a:t>invece </a:t>
-            </a:r>
-            <a:r>
-              <a:rPr lang="it-IT" sz="1800" b="0" i="0" u="none" strike="noStrike" baseline="0" dirty="0">
-                <a:solidFill>
-                  <a:srgbClr val="FF0000"/>
-                </a:solidFill>
-                <a:latin typeface="Calibri" panose="020F0502020204030204" pitchFamily="34" charset="0"/>
-              </a:rPr>
-              <a:t>gli NA invalidano il calcolo</a:t>
-            </a:r>
-          </a:p>
-          <a:p>
-            <a:pPr algn="l"/>
-            <a:r>
-              <a:rPr lang="en-US" sz="1800" b="0" i="0" u="none" strike="noStrike" baseline="0" dirty="0">
-                <a:solidFill>
-                  <a:srgbClr val="4F82BE"/>
-                </a:solidFill>
-                <a:latin typeface="Lucida Console" panose="020B0609040504020204" pitchFamily="49" charset="0"/>
+              <a:rPr lang="en-US" dirty="0">
+                <a:solidFill>
+                  <a:schemeClr val="accent1"/>
+                </a:solidFill>
+              </a:rPr>
+              <a:t>=False)</a:t>
+            </a:r>
+          </a:p>
+          <a:p>
+            <a:pPr marL="457200" lvl="1" indent="0">
+              <a:buNone/>
+            </a:pPr>
+            <a:r>
+              <a:rPr lang="en-US" dirty="0">
+                <a:solidFill>
+                  <a:schemeClr val="accent1"/>
+                </a:solidFill>
+              </a:rPr>
+              <a:t>nan</a:t>
+            </a:r>
+          </a:p>
+          <a:p>
+            <a:r>
+              <a:rPr lang="it-IT" dirty="0"/>
+              <a:t>Rispetto a </a:t>
+            </a:r>
+            <a:r>
+              <a:rPr lang="it-IT" dirty="0" err="1"/>
+              <a:t>NumPy</a:t>
+            </a:r>
+            <a:r>
+              <a:rPr lang="it-IT" dirty="0"/>
+              <a:t> sono aggiunti i metodi </a:t>
+            </a:r>
+            <a:r>
+              <a:rPr lang="it-IT" dirty="0" err="1"/>
+              <a:t>idxmin</a:t>
+            </a:r>
+            <a:r>
+              <a:rPr lang="it-IT" dirty="0"/>
+              <a:t> e </a:t>
+            </a:r>
+            <a:r>
+              <a:rPr lang="it-IT" dirty="0" err="1"/>
+              <a:t>idxmax</a:t>
+            </a:r>
+            <a:r>
+              <a:rPr lang="it-IT" dirty="0"/>
+              <a:t>, che restituiscono l’etichetta del valore minimo o massimo</a:t>
+            </a:r>
+          </a:p>
+          <a:p>
+            <a:pPr marL="457200" lvl="1" indent="0">
+              <a:buNone/>
+            </a:pPr>
+            <a:r>
+              <a:rPr lang="en-US" dirty="0">
+                <a:solidFill>
+                  <a:schemeClr val="accent1"/>
+                </a:solidFill>
               </a:rPr>
               <a:t>&gt;&gt;&gt; </a:t>
             </a:r>
             <a:r>
-              <a:rPr lang="en-US" sz="1800" b="0" i="0" u="none" strike="noStrike" baseline="0" dirty="0" err="1">
-                <a:solidFill>
-                  <a:srgbClr val="4F82BE"/>
-                </a:solidFill>
-                <a:latin typeface="Lucida Console" panose="020B0609040504020204" pitchFamily="49" charset="0"/>
+              <a:rPr lang="en-US" dirty="0" err="1">
+                <a:solidFill>
+                  <a:schemeClr val="accent1"/>
+                </a:solidFill>
               </a:rPr>
               <a:t>pd.Series</a:t>
             </a:r>
             <a:r>
-              <a:rPr lang="en-US" sz="1800" b="0" i="0" u="none" strike="noStrike" baseline="0" dirty="0">
-                <a:solidFill>
-                  <a:srgbClr val="4F82BE"/>
-                </a:solidFill>
-                <a:latin typeface="Lucida Console" panose="020B0609040504020204" pitchFamily="49" charset="0"/>
-              </a:rPr>
-              <a:t>([2, </a:t>
-            </a:r>
-            <a:r>
-              <a:rPr lang="en-US" sz="1800" b="0" i="0" u="none" strike="noStrike" baseline="0" dirty="0" err="1">
-                <a:solidFill>
-                  <a:srgbClr val="FF0000"/>
-                </a:solidFill>
-                <a:latin typeface="Lucida Console" panose="020B0609040504020204" pitchFamily="49" charset="0"/>
-              </a:rPr>
-              <a:t>np.nan</a:t>
-            </a:r>
-            <a:r>
-              <a:rPr lang="en-US" sz="1800" b="0" i="0" u="none" strike="noStrike" baseline="0" dirty="0">
-                <a:solidFill>
-                  <a:srgbClr val="4F82BE"/>
-                </a:solidFill>
-                <a:latin typeface="Lucida Console" panose="020B0609040504020204" pitchFamily="49" charset="0"/>
-              </a:rPr>
-              <a:t>, 6, 4]).mean(</a:t>
-            </a:r>
-            <a:r>
-              <a:rPr lang="en-US" sz="1800" b="0" i="0" u="none" strike="noStrike" baseline="0" dirty="0" err="1">
-                <a:solidFill>
-                  <a:srgbClr val="4F82BE"/>
-                </a:solidFill>
-                <a:latin typeface="Lucida Console" panose="020B0609040504020204" pitchFamily="49" charset="0"/>
-              </a:rPr>
-              <a:t>skipna</a:t>
-            </a:r>
-            <a:r>
-              <a:rPr lang="en-US" sz="1800" b="0" i="0" u="none" strike="noStrike" baseline="0" dirty="0">
-                <a:solidFill>
-                  <a:srgbClr val="4F82BE"/>
-                </a:solidFill>
-                <a:latin typeface="Lucida Console" panose="020B0609040504020204" pitchFamily="49" charset="0"/>
-              </a:rPr>
-              <a:t>=False)</a:t>
-            </a:r>
-          </a:p>
-          <a:p>
-            <a:pPr algn="l"/>
-            <a:r>
-              <a:rPr lang="en-US" sz="1800" b="0" i="0" u="none" strike="noStrike" baseline="0" dirty="0">
-                <a:solidFill>
-                  <a:srgbClr val="FF0000"/>
-                </a:solidFill>
-                <a:latin typeface="Lucida Console" panose="020B0609040504020204" pitchFamily="49" charset="0"/>
-              </a:rPr>
-              <a:t>nan</a:t>
-            </a:r>
-          </a:p>
-          <a:p>
-            <a:pPr algn="l"/>
-            <a:r>
-              <a:rPr lang="it-IT" sz="1800" b="0" i="0" u="none" strike="noStrike" baseline="0" dirty="0">
-                <a:solidFill>
-                  <a:srgbClr val="000000"/>
-                </a:solidFill>
-                <a:latin typeface="Calibri" panose="020F0502020204030204" pitchFamily="34" charset="0"/>
-              </a:rPr>
-              <a:t>Rispetto a </a:t>
-            </a:r>
-            <a:r>
-              <a:rPr lang="it-IT" sz="1800" b="0" i="0" u="none" strike="noStrike" baseline="0" dirty="0" err="1">
-                <a:solidFill>
-                  <a:srgbClr val="000000"/>
-                </a:solidFill>
-                <a:latin typeface="Calibri" panose="020F0502020204030204" pitchFamily="34" charset="0"/>
-              </a:rPr>
-              <a:t>NumPy</a:t>
-            </a:r>
-            <a:r>
-              <a:rPr lang="it-IT" sz="1800" b="0" i="0" u="none" strike="noStrike" baseline="0" dirty="0">
-                <a:solidFill>
-                  <a:srgbClr val="000000"/>
-                </a:solidFill>
-                <a:latin typeface="Calibri" panose="020F0502020204030204" pitchFamily="34" charset="0"/>
-              </a:rPr>
-              <a:t> sono aggiunti i metodi </a:t>
-            </a:r>
-            <a:r>
-              <a:rPr lang="it-IT" sz="1800" b="0" i="0" u="none" strike="noStrike" baseline="0" dirty="0" err="1">
-                <a:solidFill>
-                  <a:srgbClr val="4F82BE"/>
-                </a:solidFill>
-                <a:latin typeface="Lucida Console" panose="020B0609040504020204" pitchFamily="49" charset="0"/>
-              </a:rPr>
-              <a:t>idxmin</a:t>
-            </a:r>
-            <a:r>
-              <a:rPr lang="it-IT" sz="1800" b="0" i="0" u="none" strike="noStrike" baseline="0" dirty="0">
-                <a:solidFill>
-                  <a:srgbClr val="4F82BE"/>
-                </a:solidFill>
-                <a:latin typeface="Lucida Console" panose="020B0609040504020204" pitchFamily="49" charset="0"/>
-              </a:rPr>
-              <a:t> </a:t>
-            </a:r>
-            <a:r>
-              <a:rPr lang="it-IT" sz="1800" b="0" i="0" u="none" strike="noStrike" baseline="0" dirty="0">
-                <a:solidFill>
-                  <a:srgbClr val="000000"/>
-                </a:solidFill>
-                <a:latin typeface="Calibri" panose="020F0502020204030204" pitchFamily="34" charset="0"/>
-              </a:rPr>
-              <a:t>e </a:t>
-            </a:r>
-            <a:r>
-              <a:rPr lang="it-IT" sz="1800" b="0" i="0" u="none" strike="noStrike" baseline="0" dirty="0" err="1">
-                <a:solidFill>
-                  <a:srgbClr val="4F82BE"/>
-                </a:solidFill>
-                <a:latin typeface="Lucida Console" panose="020B0609040504020204" pitchFamily="49" charset="0"/>
+              <a:rPr lang="en-US" dirty="0">
+                <a:solidFill>
+                  <a:schemeClr val="accent1"/>
+                </a:solidFill>
+              </a:rPr>
+              <a:t>({"a": 6, "b": 10, "c": 7}).</a:t>
+            </a:r>
+            <a:r>
+              <a:rPr lang="en-US" dirty="0" err="1">
+                <a:solidFill>
+                  <a:schemeClr val="accent1"/>
+                </a:solidFill>
               </a:rPr>
               <a:t>idxmax</a:t>
             </a:r>
             <a:r>
-              <a:rPr lang="it-IT" sz="1800" b="0" i="0" u="none" strike="noStrike" baseline="0" dirty="0">
-                <a:solidFill>
-                  <a:srgbClr val="000000"/>
-                </a:solidFill>
-                <a:latin typeface="Calibri" panose="020F0502020204030204" pitchFamily="34" charset="0"/>
-              </a:rPr>
-              <a:t>,</a:t>
-            </a:r>
-          </a:p>
-          <a:p>
-            <a:pPr algn="l"/>
-            <a:r>
-              <a:rPr lang="it-IT" sz="1800" b="0" i="0" u="none" strike="noStrike" baseline="0" dirty="0">
-                <a:solidFill>
-                  <a:srgbClr val="000000"/>
-                </a:solidFill>
-                <a:latin typeface="Calibri" panose="020F0502020204030204" pitchFamily="34" charset="0"/>
-              </a:rPr>
-              <a:t>che restituiscono </a:t>
-            </a:r>
-            <a:r>
-              <a:rPr lang="it-IT" sz="1800" b="0" i="0" u="none" strike="noStrike" baseline="0" dirty="0">
-                <a:solidFill>
-                  <a:srgbClr val="78933C"/>
-                </a:solidFill>
-                <a:latin typeface="Calibri" panose="020F0502020204030204" pitchFamily="34" charset="0"/>
-              </a:rPr>
-              <a:t>l’etichetta del valore minimo o massimo</a:t>
-            </a:r>
-          </a:p>
-          <a:p>
-            <a:pPr algn="l"/>
-            <a:r>
-              <a:rPr lang="en-US" sz="1800" b="0" i="0" u="none" strike="noStrike" baseline="0" dirty="0">
-                <a:solidFill>
-                  <a:srgbClr val="4F82BE"/>
-                </a:solidFill>
-                <a:latin typeface="Lucida Console" panose="020B0609040504020204" pitchFamily="49" charset="0"/>
-              </a:rPr>
-              <a:t>&gt;&gt;&gt; </a:t>
-            </a:r>
-            <a:r>
-              <a:rPr lang="en-US" sz="1800" b="0" i="0" u="none" strike="noStrike" baseline="0" dirty="0" err="1">
-                <a:solidFill>
-                  <a:srgbClr val="4F82BE"/>
-                </a:solidFill>
-                <a:latin typeface="Lucida Console" panose="020B0609040504020204" pitchFamily="49" charset="0"/>
-              </a:rPr>
-              <a:t>pd.Series</a:t>
-            </a:r>
-            <a:r>
-              <a:rPr lang="en-US" sz="1800" b="0" i="0" u="none" strike="noStrike" baseline="0" dirty="0">
-                <a:solidFill>
-                  <a:srgbClr val="4F82BE"/>
-                </a:solidFill>
-                <a:latin typeface="Lucida Console" panose="020B0609040504020204" pitchFamily="49" charset="0"/>
-              </a:rPr>
-              <a:t>({"a": 6, "b": 10, "c": 7}).</a:t>
-            </a:r>
-            <a:r>
-              <a:rPr lang="en-US" sz="1800" b="0" i="0" u="none" strike="noStrike" baseline="0" dirty="0" err="1">
-                <a:solidFill>
-                  <a:srgbClr val="4F82BE"/>
-                </a:solidFill>
-                <a:latin typeface="Lucida Console" panose="020B0609040504020204" pitchFamily="49" charset="0"/>
-              </a:rPr>
-              <a:t>idxmax</a:t>
-            </a:r>
-            <a:r>
-              <a:rPr lang="en-US" sz="1800" b="0" i="0" u="none" strike="noStrike" baseline="0" dirty="0">
-                <a:solidFill>
-                  <a:srgbClr val="4F82BE"/>
-                </a:solidFill>
-                <a:latin typeface="Lucida Console" panose="020B0609040504020204" pitchFamily="49" charset="0"/>
+              <a:rPr lang="en-US" dirty="0">
+                <a:solidFill>
+                  <a:schemeClr val="accent1"/>
+                </a:solidFill>
               </a:rPr>
               <a:t>()</a:t>
             </a:r>
           </a:p>
           <a:p>
-            <a:pPr algn="l"/>
-            <a:r>
-              <a:rPr lang="en-US" sz="1800" b="0" i="0" u="none" strike="noStrike" baseline="0" dirty="0">
-                <a:solidFill>
-                  <a:srgbClr val="4F82BE"/>
-                </a:solidFill>
-                <a:latin typeface="Lucida Console" panose="020B0609040504020204" pitchFamily="49" charset="0"/>
+            <a:pPr marL="457200" lvl="1" indent="0">
+              <a:buNone/>
+            </a:pPr>
+            <a:r>
+              <a:rPr lang="en-US" dirty="0">
+                <a:solidFill>
+                  <a:schemeClr val="accent1"/>
+                </a:solidFill>
               </a:rPr>
               <a:t>'b'</a:t>
             </a:r>
-            <a:endParaRPr lang="en-US" dirty="0"/>
           </a:p>
         </p:txBody>
       </p:sp>
@@ -8433,17 +7960,20 @@
             <p:ph type="ftr" sz="quarter" idx="11"/>
           </p:nvPr>
         </p:nvSpPr>
-        <p:spPr/>
-        <p:txBody>
-          <a:bodyPr/>
-          <a:lstStyle/>
-          <a:p>
-            <a:pPr algn="l"/>
-            <a:r>
-              <a:rPr lang="it-IT"/>
+        <p:spPr>
+          <a:xfrm>
+            <a:off x="-1" y="6492875"/>
+            <a:ext cx="2837793" cy="365125"/>
+          </a:xfrm>
+        </p:spPr>
+        <p:txBody>
+          <a:bodyPr/>
+          <a:lstStyle/>
+          <a:p>
+            <a:r>
+              <a:rPr lang="it-IT" dirty="0"/>
               <a:t>Matteo Francia – University of Bologna</a:t>
             </a:r>
-            <a:endParaRPr lang="it-IT" dirty="0"/>
           </a:p>
         </p:txBody>
       </p:sp>
@@ -8463,13 +7993,19 @@
             <p:ph type="sldNum" sz="quarter" idx="12"/>
           </p:nvPr>
         </p:nvSpPr>
-        <p:spPr/>
+        <p:spPr>
+          <a:xfrm>
+            <a:off x="9448800" y="6492874"/>
+            <a:ext cx="2743200" cy="365125"/>
+          </a:xfrm>
+        </p:spPr>
         <p:txBody>
           <a:bodyPr/>
           <a:lstStyle/>
           <a:p>
             <a:fld id="{5DD6F1BA-2510-46FC-9346-AB1F3CA1593B}" type="slidenum">
               <a:rPr lang="it-IT" smtClean="0"/>
+              <a:pPr/>
               <a:t>19</a:t>
             </a:fld>
             <a:endParaRPr lang="it-IT"/>
@@ -9057,10 +8593,9 @@
           <a:lstStyle/>
           <a:p>
             <a:r>
-              <a:rPr lang="it-IT"/>
+              <a:rPr lang="it-IT" dirty="0"/>
               <a:t>Matteo Francia – University of Bologna</a:t>
             </a:r>
-            <a:endParaRPr lang="it-IT" dirty="0"/>
           </a:p>
         </p:txBody>
       </p:sp>
@@ -10086,7 +9621,12 @@
             <p:ph type="title"/>
           </p:nvPr>
         </p:nvSpPr>
-        <p:spPr/>
+        <p:spPr>
+          <a:xfrm>
+            <a:off x="838200" y="365125"/>
+            <a:ext cx="10515600" cy="1325563"/>
+          </a:xfrm>
+        </p:spPr>
         <p:txBody>
           <a:bodyPr/>
           <a:lstStyle/>
@@ -10115,265 +9655,106 @@
             <p:ph sz="half" idx="1"/>
           </p:nvPr>
         </p:nvSpPr>
-        <p:spPr/>
-        <p:txBody>
-          <a:bodyPr/>
-          <a:lstStyle/>
-          <a:p>
-            <a:pPr algn="l"/>
-            <a:r>
-              <a:rPr lang="it-IT" sz="1800" b="0" i="0" u="none" strike="noStrike" baseline="0" dirty="0">
-                <a:solidFill>
-                  <a:srgbClr val="000000"/>
-                </a:solidFill>
-                <a:latin typeface="Calibri" panose="020F0502020204030204" pitchFamily="34" charset="0"/>
-              </a:rPr>
+        <p:spPr>
+          <a:xfrm>
+            <a:off x="838200" y="1825625"/>
+            <a:ext cx="5181600" cy="4351338"/>
+          </a:xfrm>
+        </p:spPr>
+        <p:txBody>
+          <a:bodyPr/>
+          <a:lstStyle/>
+          <a:p>
+            <a:r>
+              <a:rPr lang="it-IT" dirty="0"/>
               <a:t>Un </a:t>
             </a:r>
             <a:r>
-              <a:rPr lang="it-IT" sz="1800" b="0" i="0" u="none" strike="noStrike" baseline="0" dirty="0" err="1">
+              <a:rPr lang="it-IT" dirty="0" err="1">
                 <a:solidFill>
                   <a:srgbClr val="FF0000"/>
                 </a:solidFill>
-                <a:latin typeface="Lucida Console" panose="020B0609040504020204" pitchFamily="49" charset="0"/>
               </a:rPr>
               <a:t>DataFrame</a:t>
             </a:r>
             <a:r>
-              <a:rPr lang="it-IT" sz="1800" b="0" i="0" u="none" strike="noStrike" baseline="0" dirty="0">
-                <a:solidFill>
-                  <a:srgbClr val="FF0000"/>
-                </a:solidFill>
-                <a:latin typeface="Lucida Console" panose="020B0609040504020204" pitchFamily="49" charset="0"/>
-              </a:rPr>
-              <a:t> </a:t>
-            </a:r>
-            <a:r>
-              <a:rPr lang="it-IT" sz="1800" b="0" i="0" u="none" strike="noStrike" baseline="0" dirty="0">
-                <a:solidFill>
-                  <a:srgbClr val="000000"/>
-                </a:solidFill>
-                <a:latin typeface="Calibri" panose="020F0502020204030204" pitchFamily="34" charset="0"/>
-              </a:rPr>
-              <a:t>rappresenta un set di dati in forma relazionale</a:t>
-            </a:r>
-          </a:p>
-          <a:p>
-            <a:pPr algn="l"/>
-            <a:r>
-              <a:rPr lang="it-IT" sz="1800" b="0" i="0" u="none" strike="noStrike" baseline="0" dirty="0">
-                <a:solidFill>
-                  <a:srgbClr val="000000"/>
-                </a:solidFill>
-                <a:latin typeface="Calibri" panose="020F0502020204030204" pitchFamily="34" charset="0"/>
-              </a:rPr>
-              <a:t>Può essere visto come una sequenza di colonne rappresentate</a:t>
-            </a:r>
-          </a:p>
-          <a:p>
-            <a:pPr algn="l"/>
-            <a:r>
-              <a:rPr lang="it-IT" sz="1800" b="0" i="0" u="none" strike="noStrike" baseline="0" dirty="0">
-                <a:solidFill>
-                  <a:srgbClr val="000000"/>
-                </a:solidFill>
-                <a:latin typeface="Calibri" panose="020F0502020204030204" pitchFamily="34" charset="0"/>
-              </a:rPr>
-              <a:t>da </a:t>
-            </a:r>
-            <a:r>
-              <a:rPr lang="it-IT" sz="1800" b="0" i="0" u="none" strike="noStrike" baseline="0" dirty="0">
-                <a:solidFill>
-                  <a:srgbClr val="0070C1"/>
-                </a:solidFill>
-                <a:latin typeface="Calibri" panose="020F0502020204030204" pitchFamily="34" charset="0"/>
-              </a:rPr>
-              <a:t>serie </a:t>
-            </a:r>
-            <a:r>
-              <a:rPr lang="it-IT" sz="1800" b="0" i="0" u="none" strike="noStrike" baseline="0" dirty="0">
-                <a:solidFill>
-                  <a:srgbClr val="000000"/>
-                </a:solidFill>
-                <a:latin typeface="Calibri" panose="020F0502020204030204" pitchFamily="34" charset="0"/>
-              </a:rPr>
-              <a:t>di diverso tipo </a:t>
-            </a:r>
-            <a:r>
-              <a:rPr lang="it-IT" sz="1800" b="0" i="0" u="none" strike="noStrike" baseline="0" dirty="0">
-                <a:solidFill>
-                  <a:srgbClr val="7030A1"/>
-                </a:solidFill>
-                <a:latin typeface="Calibri" panose="020F0502020204030204" pitchFamily="34" charset="0"/>
-              </a:rPr>
-              <a:t>con etichette condivise</a:t>
-            </a:r>
-          </a:p>
-          <a:p>
-            <a:pPr algn="l"/>
-            <a:r>
-              <a:rPr lang="it-IT" sz="1800" b="0" i="0" u="none" strike="noStrike" baseline="0" dirty="0">
-                <a:solidFill>
-                  <a:srgbClr val="000000"/>
-                </a:solidFill>
-                <a:latin typeface="Arial" panose="020B0604020202020204" pitchFamily="34" charset="0"/>
-              </a:rPr>
-              <a:t>– </a:t>
-            </a:r>
-            <a:r>
-              <a:rPr lang="it-IT" sz="1800" b="0" i="0" u="none" strike="noStrike" baseline="0" dirty="0">
-                <a:solidFill>
-                  <a:srgbClr val="000000"/>
-                </a:solidFill>
-                <a:latin typeface="Calibri" panose="020F0502020204030204" pitchFamily="34" charset="0"/>
-              </a:rPr>
-              <a:t>le etichette sono di solito identificatori univoci delle righe</a:t>
-            </a:r>
-          </a:p>
-          <a:p>
-            <a:pPr algn="l"/>
-            <a:r>
-              <a:rPr lang="it-IT" sz="1800" b="0" i="0" u="none" strike="noStrike" baseline="0" dirty="0">
-                <a:solidFill>
-                  <a:srgbClr val="000000"/>
-                </a:solidFill>
-                <a:latin typeface="Calibri" panose="020F0502020204030204" pitchFamily="34" charset="0"/>
-              </a:rPr>
-              <a:t>Ogni serie (colonna) ha un </a:t>
-            </a:r>
-            <a:r>
-              <a:rPr lang="it-IT" sz="1800" b="0" i="0" u="none" strike="noStrike" baseline="0" dirty="0">
-                <a:solidFill>
-                  <a:srgbClr val="00B150"/>
-                </a:solidFill>
-                <a:latin typeface="Calibri" panose="020F0502020204030204" pitchFamily="34" charset="0"/>
-              </a:rPr>
-              <a:t>nome</a:t>
-            </a:r>
-            <a:r>
-              <a:rPr lang="it-IT" sz="1800" b="0" i="0" u="none" strike="noStrike" baseline="0" dirty="0">
-                <a:solidFill>
-                  <a:srgbClr val="000000"/>
-                </a:solidFill>
-                <a:latin typeface="Calibri" panose="020F0502020204030204" pitchFamily="34" charset="0"/>
-              </a:rPr>
-              <a:t>, utilizzabile come chiave per</a:t>
-            </a:r>
-          </a:p>
-          <a:p>
-            <a:pPr algn="l"/>
-            <a:r>
-              <a:rPr lang="en-US" sz="1800" b="0" i="0" u="none" strike="noStrike" baseline="0" dirty="0" err="1">
-                <a:solidFill>
-                  <a:srgbClr val="000000"/>
-                </a:solidFill>
-                <a:latin typeface="Calibri" panose="020F0502020204030204" pitchFamily="34" charset="0"/>
-              </a:rPr>
+              <a:rPr lang="it-IT" dirty="0"/>
+              <a:t> rappresenta un set di dati in forma relazionale </a:t>
+            </a:r>
+          </a:p>
+          <a:p>
+            <a:pPr lvl="1"/>
+            <a:r>
+              <a:rPr lang="it-IT" dirty="0"/>
+              <a:t>Può essere visto come </a:t>
+            </a:r>
+            <a:r>
+              <a:rPr lang="it-IT" dirty="0">
+                <a:solidFill>
+                  <a:srgbClr val="92D050"/>
+                </a:solidFill>
+              </a:rPr>
+              <a:t>una sequenza di colonne</a:t>
+            </a:r>
+            <a:r>
+              <a:rPr lang="it-IT" dirty="0"/>
+              <a:t> rappresentate da serie di diverso tipo con </a:t>
+            </a:r>
+            <a:r>
+              <a:rPr lang="it-IT" dirty="0">
+                <a:solidFill>
+                  <a:srgbClr val="7030A0"/>
+                </a:solidFill>
+              </a:rPr>
+              <a:t>etichette condivise</a:t>
+            </a:r>
+          </a:p>
+          <a:p>
+            <a:pPr lvl="1"/>
+            <a:r>
+              <a:rPr lang="it-IT" dirty="0"/>
+              <a:t>Le </a:t>
+            </a:r>
+            <a:r>
+              <a:rPr lang="it-IT" dirty="0">
+                <a:solidFill>
+                  <a:srgbClr val="7030A0"/>
+                </a:solidFill>
+              </a:rPr>
+              <a:t>etichette</a:t>
+            </a:r>
+            <a:r>
+              <a:rPr lang="it-IT" dirty="0"/>
+              <a:t> sono di solito identificatori univoci delle righe</a:t>
+            </a:r>
+          </a:p>
+          <a:p>
+            <a:pPr lvl="1"/>
+            <a:r>
+              <a:rPr lang="it-IT" dirty="0">
+                <a:solidFill>
+                  <a:schemeClr val="accent1"/>
+                </a:solidFill>
+              </a:rPr>
+              <a:t>Ogni serie (colonna) </a:t>
+            </a:r>
+            <a:r>
+              <a:rPr lang="it-IT" dirty="0"/>
+              <a:t>ha un nome, utilizzabile come chiave per </a:t>
+            </a:r>
+            <a:r>
+              <a:rPr lang="en-US" dirty="0" err="1"/>
               <a:t>accedere</a:t>
             </a:r>
             <a:r>
-              <a:rPr lang="en-US" sz="1800" b="0" i="0" u="none" strike="noStrike" baseline="0" dirty="0">
-                <a:solidFill>
-                  <a:srgbClr val="000000"/>
-                </a:solidFill>
-                <a:latin typeface="Calibri" panose="020F0502020204030204" pitchFamily="34" charset="0"/>
-              </a:rPr>
+              <a:rPr lang="en-US" dirty="0"/>
               <a:t> ad </a:t>
             </a:r>
             <a:r>
-              <a:rPr lang="en-US" sz="1800" b="0" i="0" u="none" strike="noStrike" baseline="0" dirty="0" err="1">
-                <a:solidFill>
-                  <a:srgbClr val="000000"/>
-                </a:solidFill>
-                <a:latin typeface="Calibri" panose="020F0502020204030204" pitchFamily="34" charset="0"/>
-              </a:rPr>
+              <a:rPr lang="en-US" dirty="0" err="1"/>
               <a:t>essa</a:t>
             </a:r>
             <a:endParaRPr lang="en-US" dirty="0"/>
-          </a:p>
-        </p:txBody>
-      </p:sp>
-      <p:sp>
-        <p:nvSpPr>
-          <p:cNvPr id="4" name="Segnaposto piè di pagina 3">
-            <a:extLst>
-              <a:ext uri="{FF2B5EF4-FFF2-40B4-BE49-F238E27FC236}">
-                <a16:creationId xmlns:a16="http://schemas.microsoft.com/office/drawing/2014/main" id="{275C1F7F-2BD2-4BEE-A1C5-8DC23EFEB8DE}"/>
-              </a:ext>
-            </a:extLst>
-          </p:cNvPr>
-          <p:cNvSpPr>
-            <a:spLocks noGrp="1"/>
-          </p:cNvSpPr>
-          <p:nvPr>
-            <p:ph type="ftr" sz="quarter" idx="11"/>
-          </p:nvPr>
-        </p:nvSpPr>
-        <p:spPr/>
-        <p:txBody>
-          <a:bodyPr/>
-          <a:lstStyle/>
-          <a:p>
-            <a:pPr algn="l"/>
-            <a:r>
-              <a:rPr lang="it-IT"/>
-              <a:t>Matteo Francia – University of Bologna</a:t>
-            </a:r>
-            <a:endParaRPr lang="it-IT" dirty="0"/>
-          </a:p>
-        </p:txBody>
-      </p:sp>
-      <p:sp>
-        <p:nvSpPr>
-          <p:cNvPr id="5" name="Segnaposto numero diapositiva 4">
-            <a:extLst>
-              <a:ext uri="{FF2B5EF4-FFF2-40B4-BE49-F238E27FC236}">
-                <a16:creationId xmlns:a16="http://schemas.microsoft.com/office/drawing/2014/main" id="{439F8CCD-C0FA-4800-8364-0282B113364F}"/>
-              </a:ext>
-            </a:extLst>
-          </p:cNvPr>
-          <p:cNvSpPr>
-            <a:spLocks noGrp="1"/>
-          </p:cNvSpPr>
-          <p:nvPr>
-            <p:ph type="sldNum" sz="quarter" idx="12"/>
-          </p:nvPr>
-        </p:nvSpPr>
-        <p:spPr/>
-        <p:txBody>
-          <a:bodyPr/>
-          <a:lstStyle/>
-          <a:p>
-            <a:fld id="{5DD6F1BA-2510-46FC-9346-AB1F3CA1593B}" type="slidenum">
-              <a:rPr lang="it-IT" smtClean="0"/>
-              <a:t>23</a:t>
-            </a:fld>
-            <a:endParaRPr lang="it-IT"/>
-          </a:p>
-        </p:txBody>
-      </p:sp>
-      <p:sp>
-        <p:nvSpPr>
-          <p:cNvPr id="8" name="Segnaposto contenuto 7">
-            <a:extLst>
-              <a:ext uri="{FF2B5EF4-FFF2-40B4-BE49-F238E27FC236}">
-                <a16:creationId xmlns:a16="http://schemas.microsoft.com/office/drawing/2014/main" id="{76A0E7AB-8F6A-4F8E-8451-0BFB3D48F200}"/>
-              </a:ext>
-            </a:extLst>
-          </p:cNvPr>
-          <p:cNvSpPr>
-            <a:spLocks noGrp="1"/>
-          </p:cNvSpPr>
-          <p:nvPr>
-            <p:ph idx="13"/>
-          </p:nvPr>
-        </p:nvSpPr>
-        <p:spPr/>
-        <p:txBody>
-          <a:bodyPr/>
-          <a:lstStyle/>
-          <a:p>
-            <a:endParaRPr lang="en-US"/>
           </a:p>
         </p:txBody>
       </p:sp>
@@ -10406,6 +9787,99 @@
           </a:xfrm>
         </p:spPr>
       </p:pic>
+      <p:sp>
+        <p:nvSpPr>
+          <p:cNvPr id="4" name="Segnaposto piè di pagina 3">
+            <a:extLst>
+              <a:ext uri="{FF2B5EF4-FFF2-40B4-BE49-F238E27FC236}">
+                <a16:creationId xmlns:a16="http://schemas.microsoft.com/office/drawing/2014/main" id="{275C1F7F-2BD2-4BEE-A1C5-8DC23EFEB8DE}"/>
+              </a:ext>
+            </a:extLst>
+          </p:cNvPr>
+          <p:cNvSpPr>
+            <a:spLocks noGrp="1"/>
+          </p:cNvSpPr>
+          <p:nvPr>
+            <p:ph type="ftr" sz="quarter" idx="11"/>
+          </p:nvPr>
+        </p:nvSpPr>
+        <p:spPr>
+          <a:xfrm>
+            <a:off x="-1" y="6492875"/>
+            <a:ext cx="2837793" cy="365125"/>
+          </a:xfrm>
+        </p:spPr>
+        <p:txBody>
+          <a:bodyPr/>
+          <a:lstStyle/>
+          <a:p>
+            <a:r>
+              <a:rPr lang="it-IT" dirty="0"/>
+              <a:t>Matteo Francia – University of Bologna</a:t>
+            </a:r>
+          </a:p>
+        </p:txBody>
+      </p:sp>
+      <p:sp>
+        <p:nvSpPr>
+          <p:cNvPr id="5" name="Segnaposto numero diapositiva 4">
+            <a:extLst>
+              <a:ext uri="{FF2B5EF4-FFF2-40B4-BE49-F238E27FC236}">
+                <a16:creationId xmlns:a16="http://schemas.microsoft.com/office/drawing/2014/main" id="{439F8CCD-C0FA-4800-8364-0282B113364F}"/>
+              </a:ext>
+            </a:extLst>
+          </p:cNvPr>
+          <p:cNvSpPr>
+            <a:spLocks noGrp="1"/>
+          </p:cNvSpPr>
+          <p:nvPr>
+            <p:ph type="sldNum" sz="quarter" idx="12"/>
+          </p:nvPr>
+        </p:nvSpPr>
+        <p:spPr>
+          <a:xfrm>
+            <a:off x="9448800" y="6492874"/>
+            <a:ext cx="2743200" cy="365125"/>
+          </a:xfrm>
+        </p:spPr>
+        <p:txBody>
+          <a:bodyPr/>
+          <a:lstStyle/>
+          <a:p>
+            <a:fld id="{5DD6F1BA-2510-46FC-9346-AB1F3CA1593B}" type="slidenum">
+              <a:rPr lang="it-IT" smtClean="0"/>
+              <a:pPr/>
+              <a:t>23</a:t>
+            </a:fld>
+            <a:endParaRPr lang="it-IT"/>
+          </a:p>
+        </p:txBody>
+      </p:sp>
+      <p:sp>
+        <p:nvSpPr>
+          <p:cNvPr id="13" name="Segnaposto contenuto 12">
+            <a:extLst>
+              <a:ext uri="{FF2B5EF4-FFF2-40B4-BE49-F238E27FC236}">
+                <a16:creationId xmlns:a16="http://schemas.microsoft.com/office/drawing/2014/main" id="{9DEEA5A1-54EB-4FA9-AF8E-388DA6CC5052}"/>
+              </a:ext>
+            </a:extLst>
+          </p:cNvPr>
+          <p:cNvSpPr>
+            <a:spLocks noGrp="1"/>
+          </p:cNvSpPr>
+          <p:nvPr>
+            <p:ph idx="13"/>
+          </p:nvPr>
+        </p:nvSpPr>
+        <p:spPr/>
+        <p:txBody>
+          <a:bodyPr/>
+          <a:lstStyle/>
+          <a:p>
+            <a:endParaRPr lang="en-US"/>
+          </a:p>
+        </p:txBody>
+      </p:sp>
     </p:spTree>
     <p:extLst>
       <p:ext uri="{BB962C8B-B14F-4D97-AF65-F5344CB8AC3E}">
@@ -10452,7 +9926,12 @@
             <p:ph type="title"/>
           </p:nvPr>
         </p:nvSpPr>
-        <p:spPr/>
+        <p:spPr>
+          <a:xfrm>
+            <a:off x="838200" y="365125"/>
+            <a:ext cx="10515600" cy="1325563"/>
+          </a:xfrm>
+        </p:spPr>
         <p:txBody>
           <a:bodyPr/>
           <a:lstStyle/>
@@ -10481,376 +9960,159 @@
             <p:ph sz="half" idx="1"/>
           </p:nvPr>
         </p:nvSpPr>
-        <p:spPr/>
-        <p:txBody>
-          <a:bodyPr/>
-          <a:lstStyle/>
-          <a:p>
-            <a:pPr algn="l"/>
-            <a:r>
-              <a:rPr lang="en-US" sz="1800" b="0" i="0" u="none" strike="noStrike" baseline="0" dirty="0">
-                <a:solidFill>
-                  <a:srgbClr val="000000"/>
-                </a:solidFill>
-                <a:latin typeface="Calibri" panose="020F0502020204030204" pitchFamily="34" charset="0"/>
-              </a:rPr>
+        <p:spPr>
+          <a:xfrm>
+            <a:off x="838200" y="1825625"/>
+            <a:ext cx="5181600" cy="4351338"/>
+          </a:xfrm>
+        </p:spPr>
+        <p:txBody>
+          <a:bodyPr/>
+          <a:lstStyle/>
+          <a:p>
+            <a:r>
+              <a:rPr lang="en-US" dirty="0"/>
               <a:t>Una </a:t>
             </a:r>
             <a:r>
-              <a:rPr lang="en-US" sz="1800" b="0" i="0" u="none" strike="noStrike" baseline="0" dirty="0" err="1">
-                <a:solidFill>
-                  <a:srgbClr val="000000"/>
-                </a:solidFill>
-                <a:latin typeface="Calibri" panose="020F0502020204030204" pitchFamily="34" charset="0"/>
-              </a:rPr>
+              <a:rPr lang="en-US" dirty="0" err="1"/>
               <a:t>colonna</a:t>
             </a:r>
             <a:r>
-              <a:rPr lang="en-US" sz="1800" b="0" i="0" u="none" strike="noStrike" baseline="0" dirty="0">
-                <a:solidFill>
-                  <a:srgbClr val="000000"/>
-                </a:solidFill>
-                <a:latin typeface="Calibri" panose="020F0502020204030204" pitchFamily="34" charset="0"/>
-              </a:rPr>
+              <a:rPr lang="en-US" dirty="0"/>
               <a:t> di </a:t>
             </a:r>
             <a:r>
-              <a:rPr lang="en-US" sz="1800" b="0" i="0" u="none" strike="noStrike" baseline="0" dirty="0" err="1">
-                <a:solidFill>
-                  <a:srgbClr val="4F82BE"/>
-                </a:solidFill>
-                <a:latin typeface="Lucida Console" panose="020B0609040504020204" pitchFamily="49" charset="0"/>
-              </a:rPr>
+              <a:rPr lang="en-US" dirty="0" err="1"/>
               <a:t>DataFrame</a:t>
             </a:r>
             <a:r>
-              <a:rPr lang="en-US" sz="1800" b="0" i="0" u="none" strike="noStrike" baseline="0" dirty="0">
-                <a:solidFill>
-                  <a:srgbClr val="4F82BE"/>
-                </a:solidFill>
-                <a:latin typeface="Lucida Console" panose="020B0609040504020204" pitchFamily="49" charset="0"/>
-              </a:rPr>
+              <a:rPr lang="en-US" dirty="0"/>
               <a:t> </a:t>
             </a:r>
             <a:r>
-              <a:rPr lang="it-IT" sz="1800" b="0" i="0" u="none" strike="noStrike" baseline="0" dirty="0">
-                <a:solidFill>
-                  <a:srgbClr val="000000"/>
-                </a:solidFill>
-                <a:latin typeface="Calibri" panose="020F0502020204030204" pitchFamily="34" charset="0"/>
-              </a:rPr>
+              <a:rPr lang="it-IT" dirty="0"/>
               <a:t>può essere estratta in forma di serie usando </a:t>
             </a:r>
             <a:r>
-              <a:rPr lang="it-IT" sz="1800" b="0" i="0" u="none" strike="noStrike" baseline="0" dirty="0">
-                <a:solidFill>
-                  <a:srgbClr val="78933C"/>
-                </a:solidFill>
-                <a:latin typeface="Calibri" panose="020F0502020204030204" pitchFamily="34" charset="0"/>
+              <a:rPr lang="it-IT" dirty="0">
+                <a:solidFill>
+                  <a:srgbClr val="92D050"/>
+                </a:solidFill>
               </a:rPr>
               <a:t>il suo nome </a:t>
             </a:r>
             <a:r>
-              <a:rPr lang="en-US" sz="1800" b="0" i="0" u="none" strike="noStrike" baseline="0" dirty="0">
-                <a:solidFill>
-                  <a:srgbClr val="78933C"/>
-                </a:solidFill>
-                <a:latin typeface="Calibri" panose="020F0502020204030204" pitchFamily="34" charset="0"/>
+              <a:rPr lang="en-US" dirty="0">
+                <a:solidFill>
+                  <a:srgbClr val="92D050"/>
+                </a:solidFill>
               </a:rPr>
               <a:t>come </a:t>
             </a:r>
             <a:r>
-              <a:rPr lang="en-US" sz="1800" b="0" i="0" u="none" strike="noStrike" baseline="0" dirty="0" err="1">
-                <a:solidFill>
-                  <a:srgbClr val="78933C"/>
-                </a:solidFill>
-                <a:latin typeface="Calibri" panose="020F0502020204030204" pitchFamily="34" charset="0"/>
+              <a:rPr lang="en-US" dirty="0" err="1">
+                <a:solidFill>
+                  <a:srgbClr val="92D050"/>
+                </a:solidFill>
               </a:rPr>
               <a:t>indice</a:t>
             </a:r>
-            <a:endParaRPr lang="en-US" sz="1800" b="0" i="0" u="none" strike="noStrike" baseline="0" dirty="0">
+            <a:endParaRPr lang="en-US" dirty="0">
               <a:solidFill>
-                <a:srgbClr val="78933C"/>
+                <a:srgbClr val="92D050"/>
               </a:solidFill>
-              <a:latin typeface="Calibri" panose="020F0502020204030204" pitchFamily="34" charset="0"/>
             </a:endParaRPr>
           </a:p>
           <a:p>
             <a:pPr lvl="1"/>
             <a:r>
-              <a:rPr lang="it-IT" sz="1200" b="0" i="0" u="none" strike="noStrike" baseline="0" dirty="0">
-                <a:solidFill>
-                  <a:srgbClr val="000000"/>
-                </a:solidFill>
-                <a:latin typeface="Calibri" panose="020F0502020204030204" pitchFamily="34" charset="0"/>
-              </a:rPr>
+              <a:rPr lang="it-IT" dirty="0"/>
               <a:t>Se il nome è un </a:t>
             </a:r>
             <a:r>
-              <a:rPr lang="en-US" sz="1200" b="0" i="0" u="none" strike="noStrike" baseline="0" dirty="0" err="1">
-                <a:solidFill>
-                  <a:srgbClr val="000000"/>
-                </a:solidFill>
-                <a:latin typeface="Calibri" panose="020F0502020204030204" pitchFamily="34" charset="0"/>
-              </a:rPr>
+              <a:rPr lang="en-US" dirty="0" err="1"/>
               <a:t>identificatore</a:t>
             </a:r>
             <a:r>
-              <a:rPr lang="en-US" sz="1200" b="0" i="0" u="none" strike="noStrike" baseline="0" dirty="0">
-                <a:solidFill>
-                  <a:srgbClr val="000000"/>
-                </a:solidFill>
-                <a:latin typeface="Calibri" panose="020F0502020204030204" pitchFamily="34" charset="0"/>
-              </a:rPr>
+              <a:rPr lang="en-US" dirty="0"/>
               <a:t> Python </a:t>
             </a:r>
             <a:r>
-              <a:rPr lang="en-US" sz="1200" b="0" i="0" u="none" strike="noStrike" baseline="0" dirty="0" err="1">
-                <a:solidFill>
-                  <a:srgbClr val="000000"/>
-                </a:solidFill>
-                <a:latin typeface="Calibri" panose="020F0502020204030204" pitchFamily="34" charset="0"/>
-              </a:rPr>
+              <a:rPr lang="en-US" dirty="0" err="1"/>
               <a:t>valido</a:t>
             </a:r>
             <a:r>
-              <a:rPr lang="en-US" sz="1200" dirty="0">
-                <a:solidFill>
-                  <a:srgbClr val="000000"/>
-                </a:solidFill>
-                <a:latin typeface="Calibri" panose="020F0502020204030204" pitchFamily="34" charset="0"/>
-              </a:rPr>
+              <a:rPr lang="en-US" dirty="0"/>
               <a:t> </a:t>
             </a:r>
             <a:r>
-              <a:rPr lang="it-IT" sz="1200" b="0" i="0" u="none" strike="noStrike" baseline="0" dirty="0">
-                <a:solidFill>
-                  <a:srgbClr val="000000"/>
-                </a:solidFill>
-                <a:latin typeface="Calibri" panose="020F0502020204030204" pitchFamily="34" charset="0"/>
-              </a:rPr>
+              <a:rPr lang="it-IT" dirty="0"/>
               <a:t>non usato da </a:t>
             </a:r>
             <a:r>
-              <a:rPr lang="it-IT" sz="1200" b="0" i="0" u="none" strike="noStrike" baseline="0" dirty="0" err="1">
-                <a:solidFill>
-                  <a:srgbClr val="000000"/>
-                </a:solidFill>
-                <a:latin typeface="Calibri" panose="020F0502020204030204" pitchFamily="34" charset="0"/>
-              </a:rPr>
+              <a:rPr lang="it-IT" dirty="0" err="1"/>
               <a:t>pandas</a:t>
             </a:r>
             <a:r>
-              <a:rPr lang="it-IT" sz="1200" b="0" i="0" u="none" strike="noStrike" baseline="0" dirty="0">
-                <a:solidFill>
-                  <a:srgbClr val="000000"/>
-                </a:solidFill>
-                <a:latin typeface="Calibri" panose="020F0502020204030204" pitchFamily="34" charset="0"/>
-              </a:rPr>
+              <a:rPr lang="it-IT" dirty="0"/>
               <a:t>, si può </a:t>
             </a:r>
             <a:r>
-              <a:rPr lang="en-US" sz="1200" b="0" i="0" u="none" strike="noStrike" baseline="0" dirty="0" err="1">
-                <a:solidFill>
-                  <a:srgbClr val="000000"/>
-                </a:solidFill>
-                <a:latin typeface="Calibri" panose="020F0502020204030204" pitchFamily="34" charset="0"/>
-              </a:rPr>
+              <a:rPr lang="en-US" dirty="0" err="1"/>
               <a:t>accedere</a:t>
             </a:r>
             <a:r>
-              <a:rPr lang="en-US" sz="1200" b="0" i="0" u="none" strike="noStrike" baseline="0" dirty="0">
-                <a:solidFill>
-                  <a:srgbClr val="000000"/>
-                </a:solidFill>
-                <a:latin typeface="Calibri" panose="020F0502020204030204" pitchFamily="34" charset="0"/>
-              </a:rPr>
+              <a:rPr lang="en-US" dirty="0"/>
               <a:t> </a:t>
             </a:r>
             <a:r>
-              <a:rPr lang="en-US" sz="1200" b="0" i="0" u="none" strike="noStrike" baseline="0" dirty="0" err="1">
-                <a:solidFill>
-                  <a:srgbClr val="000000"/>
-                </a:solidFill>
-                <a:latin typeface="Calibri" panose="020F0502020204030204" pitchFamily="34" charset="0"/>
-              </a:rPr>
+              <a:rPr lang="en-US" dirty="0" err="1"/>
               <a:t>alla</a:t>
             </a:r>
             <a:r>
-              <a:rPr lang="en-US" sz="1200" b="0" i="0" u="none" strike="noStrike" baseline="0" dirty="0">
-                <a:solidFill>
-                  <a:srgbClr val="000000"/>
-                </a:solidFill>
-                <a:latin typeface="Calibri" panose="020F0502020204030204" pitchFamily="34" charset="0"/>
-              </a:rPr>
+              <a:rPr lang="en-US" dirty="0"/>
               <a:t> </a:t>
             </a:r>
             <a:r>
-              <a:rPr lang="en-US" sz="1200" b="0" i="0" u="none" strike="noStrike" baseline="0" dirty="0" err="1">
-                <a:solidFill>
-                  <a:srgbClr val="000000"/>
-                </a:solidFill>
-                <a:latin typeface="Calibri" panose="020F0502020204030204" pitchFamily="34" charset="0"/>
-              </a:rPr>
+              <a:rPr lang="en-US" dirty="0" err="1"/>
               <a:t>colonna</a:t>
             </a:r>
             <a:r>
-              <a:rPr lang="en-US" sz="1200" b="0" i="0" u="none" strike="noStrike" baseline="0" dirty="0">
-                <a:solidFill>
-                  <a:srgbClr val="000000"/>
-                </a:solidFill>
-                <a:latin typeface="Calibri" panose="020F0502020204030204" pitchFamily="34" charset="0"/>
-              </a:rPr>
-              <a:t> </a:t>
-            </a:r>
-            <a:r>
-              <a:rPr lang="en-US" sz="1200" b="0" i="0" u="none" strike="noStrike" baseline="0" dirty="0">
-                <a:solidFill>
-                  <a:srgbClr val="C1504D"/>
-                </a:solidFill>
-                <a:latin typeface="Calibri" panose="020F0502020204030204" pitchFamily="34" charset="0"/>
-              </a:rPr>
-              <a:t>come se fosse un </a:t>
-            </a:r>
-            <a:r>
-              <a:rPr lang="en-US" sz="1200" b="0" i="0" u="none" strike="noStrike" baseline="0" dirty="0" err="1">
-                <a:solidFill>
-                  <a:srgbClr val="C1504D"/>
-                </a:solidFill>
-                <a:latin typeface="Calibri" panose="020F0502020204030204" pitchFamily="34" charset="0"/>
-              </a:rPr>
+              <a:rPr lang="en-US" dirty="0"/>
+              <a:t> come se fosse un </a:t>
+            </a:r>
+            <a:r>
+              <a:rPr lang="en-US" dirty="0" err="1"/>
               <a:t>attributo</a:t>
             </a:r>
-            <a:endParaRPr lang="en-US" sz="1200" b="0" i="0" u="none" strike="noStrike" baseline="0" dirty="0">
+            <a:endParaRPr lang="en-US" dirty="0"/>
+          </a:p>
+          <a:p>
+            <a:pPr marL="457200" lvl="1" indent="0">
+              <a:buNone/>
+            </a:pPr>
+            <a:r>
+              <a:rPr lang="en-US" dirty="0">
+                <a:solidFill>
+                  <a:schemeClr val="accent1"/>
+                </a:solidFill>
+              </a:rPr>
+              <a:t>	&gt;&gt;&gt; </a:t>
+            </a:r>
+            <a:r>
+              <a:rPr lang="en-US" dirty="0" err="1">
+                <a:solidFill>
+                  <a:schemeClr val="accent1"/>
+                </a:solidFill>
+              </a:rPr>
+              <a:t>df.year</a:t>
+            </a:r>
+            <a:endParaRPr lang="en-US" dirty="0">
               <a:solidFill>
-                <a:srgbClr val="C1504D"/>
+                <a:schemeClr val="accent1"/>
               </a:solidFill>
-              <a:latin typeface="Calibri" panose="020F0502020204030204" pitchFamily="34" charset="0"/>
             </a:endParaRPr>
-          </a:p>
-          <a:p>
-            <a:pPr lvl="1"/>
-            <a:r>
-              <a:rPr lang="en-US" sz="1200" b="0" i="0" u="none" strike="noStrike" baseline="0" dirty="0">
-                <a:solidFill>
-                  <a:srgbClr val="000000"/>
-                </a:solidFill>
-                <a:latin typeface="Calibri" panose="020F0502020204030204" pitchFamily="34" charset="0"/>
-              </a:rPr>
-              <a:t>Utile in </a:t>
-            </a:r>
-            <a:r>
-              <a:rPr lang="en-US" sz="1200" b="0" i="0" u="none" strike="noStrike" baseline="0" dirty="0" err="1">
-                <a:solidFill>
-                  <a:srgbClr val="000000"/>
-                </a:solidFill>
-                <a:latin typeface="Calibri" panose="020F0502020204030204" pitchFamily="34" charset="0"/>
-              </a:rPr>
-              <a:t>modalità</a:t>
-            </a:r>
-            <a:r>
-              <a:rPr lang="en-US" sz="1200" b="0" i="0" u="none" strike="noStrike" baseline="0" dirty="0">
-                <a:solidFill>
-                  <a:srgbClr val="000000"/>
-                </a:solidFill>
-                <a:latin typeface="Calibri" panose="020F0502020204030204" pitchFamily="34" charset="0"/>
-              </a:rPr>
-              <a:t> </a:t>
-            </a:r>
-            <a:r>
-              <a:rPr lang="en-US" sz="1200" b="0" i="0" u="none" strike="noStrike" baseline="0" dirty="0" err="1">
-                <a:solidFill>
-                  <a:srgbClr val="000000"/>
-                </a:solidFill>
-                <a:latin typeface="Calibri" panose="020F0502020204030204" pitchFamily="34" charset="0"/>
-              </a:rPr>
-              <a:t>interattiva</a:t>
-            </a:r>
-            <a:endParaRPr lang="en-US" dirty="0"/>
-          </a:p>
-        </p:txBody>
-      </p:sp>
-      <p:sp>
-        <p:nvSpPr>
-          <p:cNvPr id="4" name="Segnaposto piè di pagina 3">
-            <a:extLst>
-              <a:ext uri="{FF2B5EF4-FFF2-40B4-BE49-F238E27FC236}">
-                <a16:creationId xmlns:a16="http://schemas.microsoft.com/office/drawing/2014/main" id="{275C1F7F-2BD2-4BEE-A1C5-8DC23EFEB8DE}"/>
-              </a:ext>
-            </a:extLst>
-          </p:cNvPr>
-          <p:cNvSpPr>
-            <a:spLocks noGrp="1"/>
-          </p:cNvSpPr>
-          <p:nvPr>
-            <p:ph type="ftr" sz="quarter" idx="11"/>
-          </p:nvPr>
-        </p:nvSpPr>
-        <p:spPr/>
-        <p:txBody>
-          <a:bodyPr/>
-          <a:lstStyle/>
-          <a:p>
-            <a:pPr algn="l"/>
-            <a:r>
-              <a:rPr lang="it-IT"/>
-              <a:t>Matteo Francia – University of Bologna</a:t>
-            </a:r>
-            <a:endParaRPr lang="it-IT" dirty="0"/>
-          </a:p>
-        </p:txBody>
-      </p:sp>
-      <p:sp>
-        <p:nvSpPr>
-          <p:cNvPr id="5" name="Segnaposto numero diapositiva 4">
-            <a:extLst>
-              <a:ext uri="{FF2B5EF4-FFF2-40B4-BE49-F238E27FC236}">
-                <a16:creationId xmlns:a16="http://schemas.microsoft.com/office/drawing/2014/main" id="{439F8CCD-C0FA-4800-8364-0282B113364F}"/>
-              </a:ext>
-            </a:extLst>
-          </p:cNvPr>
-          <p:cNvSpPr>
-            <a:spLocks noGrp="1"/>
-          </p:cNvSpPr>
-          <p:nvPr>
-            <p:ph type="sldNum" sz="quarter" idx="12"/>
-          </p:nvPr>
-        </p:nvSpPr>
-        <p:spPr/>
-        <p:txBody>
-          <a:bodyPr/>
-          <a:lstStyle/>
-          <a:p>
-            <a:fld id="{5DD6F1BA-2510-46FC-9346-AB1F3CA1593B}" type="slidenum">
-              <a:rPr lang="it-IT" smtClean="0"/>
-              <a:t>24</a:t>
-            </a:fld>
-            <a:endParaRPr lang="it-IT"/>
-          </a:p>
-        </p:txBody>
-      </p:sp>
-      <p:sp>
-        <p:nvSpPr>
-          <p:cNvPr id="8" name="Segnaposto contenuto 7">
-            <a:extLst>
-              <a:ext uri="{FF2B5EF4-FFF2-40B4-BE49-F238E27FC236}">
-                <a16:creationId xmlns:a16="http://schemas.microsoft.com/office/drawing/2014/main" id="{76A0E7AB-8F6A-4F8E-8451-0BFB3D48F200}"/>
-              </a:ext>
-            </a:extLst>
-          </p:cNvPr>
-          <p:cNvSpPr>
-            <a:spLocks noGrp="1"/>
-          </p:cNvSpPr>
-          <p:nvPr>
-            <p:ph idx="13"/>
-          </p:nvPr>
-        </p:nvSpPr>
-        <p:spPr/>
-        <p:txBody>
-          <a:bodyPr/>
-          <a:lstStyle/>
-          <a:p>
-            <a:endParaRPr lang="en-US"/>
           </a:p>
         </p:txBody>
       </p:sp>
@@ -10883,6 +10145,99 @@
           </a:xfrm>
         </p:spPr>
       </p:pic>
+      <p:sp>
+        <p:nvSpPr>
+          <p:cNvPr id="4" name="Segnaposto piè di pagina 3">
+            <a:extLst>
+              <a:ext uri="{FF2B5EF4-FFF2-40B4-BE49-F238E27FC236}">
+                <a16:creationId xmlns:a16="http://schemas.microsoft.com/office/drawing/2014/main" id="{275C1F7F-2BD2-4BEE-A1C5-8DC23EFEB8DE}"/>
+              </a:ext>
+            </a:extLst>
+          </p:cNvPr>
+          <p:cNvSpPr>
+            <a:spLocks noGrp="1"/>
+          </p:cNvSpPr>
+          <p:nvPr>
+            <p:ph type="ftr" sz="quarter" idx="11"/>
+          </p:nvPr>
+        </p:nvSpPr>
+        <p:spPr>
+          <a:xfrm>
+            <a:off x="-1" y="6492875"/>
+            <a:ext cx="2837793" cy="365125"/>
+          </a:xfrm>
+        </p:spPr>
+        <p:txBody>
+          <a:bodyPr/>
+          <a:lstStyle/>
+          <a:p>
+            <a:r>
+              <a:rPr lang="it-IT" dirty="0"/>
+              <a:t>Matteo Francia – University of Bologna</a:t>
+            </a:r>
+          </a:p>
+        </p:txBody>
+      </p:sp>
+      <p:sp>
+        <p:nvSpPr>
+          <p:cNvPr id="5" name="Segnaposto numero diapositiva 4">
+            <a:extLst>
+              <a:ext uri="{FF2B5EF4-FFF2-40B4-BE49-F238E27FC236}">
+                <a16:creationId xmlns:a16="http://schemas.microsoft.com/office/drawing/2014/main" id="{439F8CCD-C0FA-4800-8364-0282B113364F}"/>
+              </a:ext>
+            </a:extLst>
+          </p:cNvPr>
+          <p:cNvSpPr>
+            <a:spLocks noGrp="1"/>
+          </p:cNvSpPr>
+          <p:nvPr>
+            <p:ph type="sldNum" sz="quarter" idx="12"/>
+          </p:nvPr>
+        </p:nvSpPr>
+        <p:spPr>
+          <a:xfrm>
+            <a:off x="9448800" y="6492874"/>
+            <a:ext cx="2743200" cy="365125"/>
+          </a:xfrm>
+        </p:spPr>
+        <p:txBody>
+          <a:bodyPr/>
+          <a:lstStyle/>
+          <a:p>
+            <a:fld id="{5DD6F1BA-2510-46FC-9346-AB1F3CA1593B}" type="slidenum">
+              <a:rPr lang="it-IT" smtClean="0"/>
+              <a:pPr/>
+              <a:t>24</a:t>
+            </a:fld>
+            <a:endParaRPr lang="it-IT"/>
+          </a:p>
+        </p:txBody>
+      </p:sp>
+      <p:sp>
+        <p:nvSpPr>
+          <p:cNvPr id="13" name="Segnaposto contenuto 12">
+            <a:extLst>
+              <a:ext uri="{FF2B5EF4-FFF2-40B4-BE49-F238E27FC236}">
+                <a16:creationId xmlns:a16="http://schemas.microsoft.com/office/drawing/2014/main" id="{DBE27682-D95B-45A7-84A6-52A60EB5C0EF}"/>
+              </a:ext>
+            </a:extLst>
+          </p:cNvPr>
+          <p:cNvSpPr>
+            <a:spLocks noGrp="1"/>
+          </p:cNvSpPr>
+          <p:nvPr>
+            <p:ph idx="13"/>
+          </p:nvPr>
+        </p:nvSpPr>
+        <p:spPr/>
+        <p:txBody>
+          <a:bodyPr/>
+          <a:lstStyle/>
+          <a:p>
+            <a:endParaRPr lang="en-US"/>
+          </a:p>
+        </p:txBody>
+      </p:sp>
     </p:spTree>
     <p:extLst>
       <p:ext uri="{BB962C8B-B14F-4D97-AF65-F5344CB8AC3E}">
@@ -11040,14 +10395,16 @@
             </a:r>
           </a:p>
           <a:p>
-            <a:pPr lvl="1"/>
+            <a:pPr marL="457200" lvl="1" indent="0">
+              <a:buNone/>
+            </a:pPr>
             <a:r>
               <a:rPr lang="en-US" dirty="0">
                 <a:solidFill>
                   <a:schemeClr val="accent1"/>
                 </a:solidFill>
               </a:rPr>
-              <a:t>&gt;&gt;&gt; data = </a:t>
+              <a:t>	&gt;&gt;&gt; data = </a:t>
             </a:r>
             <a:r>
               <a:rPr lang="en-US" dirty="0" err="1">
@@ -11095,10 +10452,9 @@
           <a:lstStyle/>
           <a:p>
             <a:r>
-              <a:rPr lang="it-IT"/>
+              <a:rPr lang="it-IT" dirty="0"/>
               <a:t>Matteo Francia – University of Bologna</a:t>
             </a:r>
-            <a:endParaRPr lang="it-IT" dirty="0"/>
           </a:p>
         </p:txBody>
       </p:sp>
@@ -11554,10 +10910,9 @@
           <a:p>
             <a:pPr algn="l"/>
             <a:r>
-              <a:rPr lang="it-IT"/>
+              <a:rPr lang="it-IT" dirty="0"/>
               <a:t>Matteo Francia – University of Bologna</a:t>
             </a:r>
-            <a:endParaRPr lang="it-IT" dirty="0"/>
           </a:p>
         </p:txBody>
       </p:sp>

</xml_diff>